<commit_message>
Added another demo; Added speaker notes
</commit_message>
<xml_diff>
--- a/O3653-7 Deep Dive into the Office 365 APIs for OneNote services/O3653-7 Deep Dive into the Office 365 APIs for OneNote services.pptx
+++ b/O3653-7 Deep Dive into the Office 365 APIs for OneNote services/O3653-7 Deep Dive into the Office 365 APIs for OneNote services.pptx
@@ -6,10 +6,10 @@
     <p:sldMasterId id="2147484046" r:id="rId5"/>
   </p:sldMasterIdLst>
   <p:notesMasterIdLst>
-    <p:notesMasterId r:id="rId36"/>
+    <p:notesMasterId r:id="rId37"/>
   </p:notesMasterIdLst>
   <p:handoutMasterIdLst>
-    <p:handoutMasterId r:id="rId37"/>
+    <p:handoutMasterId r:id="rId38"/>
   </p:handoutMasterIdLst>
   <p:sldIdLst>
     <p:sldId id="648" r:id="rId6"/>
@@ -41,7 +41,8 @@
     <p:sldId id="689" r:id="rId32"/>
     <p:sldId id="685" r:id="rId33"/>
     <p:sldId id="686" r:id="rId34"/>
-    <p:sldId id="654" r:id="rId35"/>
+    <p:sldId id="691" r:id="rId35"/>
+    <p:sldId id="654" r:id="rId36"/>
   </p:sldIdLst>
   <p:sldSz cx="12188825" cy="6858000"/>
   <p:notesSz cx="6858000" cy="9144000"/>
@@ -344,7 +345,7 @@
           <a:p>
             <a:fld id="{DE219B1A-AE41-483B-A766-69B9363DDA6A}" type="datetimeFigureOut">
               <a:rPr lang="en-US" smtClean="0"/>
-              <a:t>9/18/2014</a:t>
+              <a:t>10/4/2014</a:t>
             </a:fld>
             <a:endParaRPr lang="en-US"/>
           </a:p>
@@ -626,7 +627,7 @@
           <a:p>
             <a:fld id="{D51B1278-D92B-4AF3-A9C1-71DD298190CE}" type="datetimeFigureOut">
               <a:rPr lang="en-US" smtClean="0"/>
-              <a:t>9/18/2014</a:t>
+              <a:t>10/4/2014</a:t>
             </a:fld>
             <a:endParaRPr lang="en-US"/>
           </a:p>
@@ -1114,7 +1115,7 @@
           <a:p>
             <a:fld id="{D4664A66-7F43-48D1-91D2-AE7A931D6495}" type="datetime1">
               <a:rPr lang="en-US" smtClean="0"/>
-              <a:t>9/18/2014</a:t>
+              <a:t>10/4/2014</a:t>
             </a:fld>
             <a:endParaRPr lang="en-US"/>
           </a:p>
@@ -1382,65 +1383,11 @@
           <a:p>
             <a:r>
               <a:rPr lang="en-US" dirty="0" smtClean="0"/>
-              <a:t>This</a:t>
+              <a:t>Four steps to follow</a:t>
             </a:r>
             <a:r>
               <a:rPr lang="en-US" baseline="0" dirty="0" smtClean="0"/>
-              <a:t> snippet represents a simple text capture.</a:t>
-            </a:r>
-          </a:p>
-          <a:p>
-            <a:endParaRPr lang="en-US" baseline="0" dirty="0" smtClean="0"/>
-          </a:p>
-          <a:p>
-            <a:r>
-              <a:rPr lang="en-US" baseline="0" dirty="0" smtClean="0"/>
-              <a:t>In addition, it provides the basic structure that the following snippets will build upon:</a:t>
-            </a:r>
-          </a:p>
-          <a:p>
-            <a:pPr marL="171450" indent="-171450">
-              <a:buFontTx/>
-              <a:buChar char="-"/>
-            </a:pPr>
-            <a:r>
-              <a:rPr lang="en-US" baseline="0" dirty="0" smtClean="0"/>
-              <a:t>Create an </a:t>
-            </a:r>
-            <a:r>
-              <a:rPr lang="en-US" baseline="0" dirty="0" err="1" smtClean="0"/>
-              <a:t>HttpClient</a:t>
-            </a:r>
-            <a:endParaRPr lang="en-US" baseline="0" dirty="0" smtClean="0"/>
-          </a:p>
-          <a:p>
-            <a:pPr marL="171450" indent="-171450">
-              <a:buFontTx/>
-              <a:buChar char="-"/>
-            </a:pPr>
-            <a:r>
-              <a:rPr lang="en-US" baseline="0" dirty="0" smtClean="0"/>
-              <a:t>Set the Headers</a:t>
-            </a:r>
-          </a:p>
-          <a:p>
-            <a:pPr marL="171450" indent="-171450">
-              <a:buFontTx/>
-              <a:buChar char="-"/>
-            </a:pPr>
-            <a:r>
-              <a:rPr lang="en-US" baseline="0" dirty="0" smtClean="0"/>
-              <a:t>Build the content for the to-be-created page</a:t>
-            </a:r>
-          </a:p>
-          <a:p>
-            <a:pPr marL="171450" indent="-171450">
-              <a:buFontTx/>
-              <a:buChar char="-"/>
-            </a:pPr>
-            <a:r>
-              <a:rPr lang="en-US" baseline="0" dirty="0" smtClean="0"/>
-              <a:t>Post to the endpoint</a:t>
+              <a:t> when building a custom application</a:t>
             </a:r>
             <a:endParaRPr lang="en-US" dirty="0"/>
           </a:p>
@@ -1461,9 +1408,9 @@
           <a:bodyPr/>
           <a:lstStyle/>
           <a:p>
-            <a:fld id="{4AED148B-7CB7-405A-AC08-8A9064AA46CA}" type="datetime1">
+            <a:fld id="{92F23F28-E1AB-4360-A982-2D9C5C9E6804}" type="datetime1">
               <a:rPr lang="en-US" smtClean="0"/>
-              <a:t>9/18/2014</a:t>
+              <a:t>10/4/2014</a:t>
             </a:fld>
             <a:endParaRPr lang="en-US"/>
           </a:p>
@@ -1486,7 +1433,7 @@
           <a:p>
             <a:fld id="{B4008EB6-D09E-4580-8CD6-DDB14511944F}" type="slidenum">
               <a:rPr lang="en-US" smtClean="0"/>
-              <a:t>23</a:t>
+              <a:t>13</a:t>
             </a:fld>
             <a:endParaRPr lang="en-US" dirty="0"/>
           </a:p>
@@ -1594,7 +1541,7 @@
     </p:spTree>
     <p:extLst>
       <p:ext uri="{BB962C8B-B14F-4D97-AF65-F5344CB8AC3E}">
-        <p14:creationId xmlns:p14="http://schemas.microsoft.com/office/powerpoint/2010/main" val="2492462827"/>
+        <p14:creationId xmlns:p14="http://schemas.microsoft.com/office/powerpoint/2010/main" val="2562866239"/>
       </p:ext>
     </p:extLst>
   </p:cSld>
@@ -1650,77 +1597,21 @@
           <a:p>
             <a:r>
               <a:rPr lang="en-US" dirty="0" smtClean="0"/>
-              <a:t>Capturing</a:t>
+              <a:t>Step 1: Register your app</a:t>
+            </a:r>
+          </a:p>
+          <a:p>
+            <a:endParaRPr lang="en-US" dirty="0" smtClean="0"/>
+          </a:p>
+          <a:p>
+            <a:r>
+              <a:rPr lang="en-US" dirty="0" smtClean="0"/>
+              <a:t>Note that none of the options requires O365/Azure account. Inquire of the product group about timing</a:t>
             </a:r>
             <a:r>
               <a:rPr lang="en-US" baseline="0" dirty="0" smtClean="0"/>
-              <a:t> an image requires </a:t>
-            </a:r>
-            <a:r>
-              <a:rPr lang="en-US" baseline="0" dirty="0" err="1" smtClean="0"/>
-              <a:t>MultipartFormDataContent</a:t>
-            </a:r>
-            <a:r>
-              <a:rPr lang="en-US" baseline="0" dirty="0" smtClean="0"/>
-              <a:t>. The “src” attribute of the&lt;</a:t>
-            </a:r>
-            <a:r>
-              <a:rPr lang="en-US" baseline="0" dirty="0" err="1" smtClean="0"/>
-              <a:t>img</a:t>
-            </a:r>
-            <a:r>
-              <a:rPr lang="en-US" baseline="0" dirty="0" smtClean="0"/>
-              <a:t>&gt; tag has a specific protocol and value.</a:t>
-            </a:r>
-          </a:p>
-          <a:p>
-            <a:endParaRPr lang="en-US" baseline="0" dirty="0" smtClean="0"/>
-          </a:p>
-          <a:p>
-            <a:r>
-              <a:rPr lang="en-US" baseline="0" dirty="0" smtClean="0"/>
-              <a:t>The protocol “name:” indicates the image is contained in another part of the Form Data with the given name (“image1” in this example).</a:t>
-            </a:r>
-          </a:p>
-          <a:p>
-            <a:endParaRPr lang="en-US" baseline="0" dirty="0" smtClean="0"/>
-          </a:p>
-          <a:p>
-            <a:r>
-              <a:rPr lang="en-US" baseline="0" dirty="0" smtClean="0"/>
-              <a:t>Point out the names of the content in the </a:t>
-            </a:r>
-            <a:r>
-              <a:rPr lang="en-US" baseline="0" dirty="0" err="1" smtClean="0"/>
-              <a:t>MultipartFormDataContent</a:t>
-            </a:r>
-            <a:r>
-              <a:rPr lang="en-US" baseline="0" dirty="0" smtClean="0"/>
-              <a:t>. The string content (the html) is named “Presentation” and the image bytes are named the same as the value in the src attribute of the &lt;</a:t>
-            </a:r>
-            <a:r>
-              <a:rPr lang="en-US" baseline="0" dirty="0" err="1" smtClean="0"/>
-              <a:t>img</a:t>
-            </a:r>
-            <a:r>
-              <a:rPr lang="en-US" baseline="0" dirty="0" smtClean="0"/>
-              <a:t>&gt; tag.</a:t>
-            </a:r>
-          </a:p>
-          <a:p>
-            <a:endParaRPr lang="en-US" baseline="0" dirty="0" smtClean="0"/>
-          </a:p>
-          <a:p>
-            <a:r>
-              <a:rPr lang="en-US" baseline="0" dirty="0" smtClean="0"/>
-              <a:t>The name “Presentation” is required – indicates the main part of the capture.</a:t>
-            </a:r>
-            <a:endParaRPr lang="en-US" baseline="0" dirty="0" smtClean="0"/>
-          </a:p>
-          <a:p>
-            <a:endParaRPr lang="en-US" dirty="0" smtClean="0"/>
-          </a:p>
-          <a:p>
+              <a:t> of integration with Azure AD.</a:t>
+            </a:r>
             <a:endParaRPr lang="en-US" dirty="0"/>
           </a:p>
         </p:txBody>
@@ -1740,9 +1631,9 @@
           <a:bodyPr/>
           <a:lstStyle/>
           <a:p>
-            <a:fld id="{BAA480A6-A57E-488B-9D67-747E5D1E1440}" type="datetime1">
+            <a:fld id="{29CEA73E-1B28-4315-88DA-A3541AB62030}" type="datetime1">
               <a:rPr lang="en-US" smtClean="0"/>
-              <a:t>9/18/2014</a:t>
+              <a:t>10/4/2014</a:t>
             </a:fld>
             <a:endParaRPr lang="en-US"/>
           </a:p>
@@ -1765,7 +1656,7 @@
           <a:p>
             <a:fld id="{B4008EB6-D09E-4580-8CD6-DDB14511944F}" type="slidenum">
               <a:rPr lang="en-US" smtClean="0"/>
-              <a:t>24</a:t>
+              <a:t>14</a:t>
             </a:fld>
             <a:endParaRPr lang="en-US" dirty="0"/>
           </a:p>
@@ -1873,7 +1764,7 @@
     </p:spTree>
     <p:extLst>
       <p:ext uri="{BB962C8B-B14F-4D97-AF65-F5344CB8AC3E}">
-        <p14:creationId xmlns:p14="http://schemas.microsoft.com/office/powerpoint/2010/main" val="1097414061"/>
+        <p14:creationId xmlns:p14="http://schemas.microsoft.com/office/powerpoint/2010/main" val="2898303334"/>
       </p:ext>
     </p:extLst>
   </p:cSld>
@@ -1929,24 +1820,134 @@
           <a:p>
             <a:r>
               <a:rPr lang="en-US" dirty="0" smtClean="0"/>
-              <a:t>The first method </a:t>
-            </a:r>
+              <a:t>Step 2: Authenticate</a:t>
+            </a:r>
+            <a:r>
+              <a:rPr lang="en-US" baseline="0" dirty="0" smtClean="0"/>
+              <a:t> the user</a:t>
+            </a:r>
+            <a:endParaRPr lang="en-US" dirty="0" smtClean="0"/>
+          </a:p>
+          <a:p>
+            <a:endParaRPr lang="en-US" dirty="0" smtClean="0"/>
+          </a:p>
+          <a:p>
             <a:r>
               <a:rPr lang="en-US" dirty="0" smtClean="0"/>
-              <a:t>is great for archiving things you see on web sites that change frequently.</a:t>
-            </a:r>
-          </a:p>
-          <a:p>
+              <a:t>The package is “</a:t>
+            </a:r>
+            <a:r>
+              <a:rPr lang="en-US" dirty="0" err="1" smtClean="0"/>
+              <a:t>LiveSDK</a:t>
+            </a:r>
+            <a:r>
+              <a:rPr lang="en-US" dirty="0" smtClean="0"/>
+              <a:t>” for Windows</a:t>
+            </a:r>
+            <a:r>
+              <a:rPr lang="en-US" baseline="0" dirty="0" smtClean="0"/>
+              <a:t> Store and “</a:t>
+            </a:r>
+            <a:r>
+              <a:rPr lang="en-US" baseline="0" dirty="0" err="1" smtClean="0"/>
+              <a:t>LiveSDKServer</a:t>
+            </a:r>
+            <a:r>
+              <a:rPr lang="en-US" baseline="0" dirty="0" smtClean="0"/>
+              <a:t>” for ASP/MVC</a:t>
+            </a:r>
             <a:endParaRPr lang="en-US" dirty="0" smtClean="0"/>
           </a:p>
           <a:p>
+            <a:endParaRPr lang="en-US" dirty="0" smtClean="0"/>
+          </a:p>
+          <a:p>
+            <a:r>
+              <a:rPr lang="en-US" dirty="0" err="1" smtClean="0"/>
+              <a:t>WinStore</a:t>
+            </a:r>
             <a:r>
               <a:rPr lang="en-US" dirty="0" smtClean="0"/>
-              <a:t>The second method is useful when the web page is more-complex than the OneNote page can faithfully render, or when the page requires login credentials. It is important to know that the HTML in the non-presentation block cannot use the data-render-src attribute.</a:t>
-            </a:r>
-          </a:p>
-          <a:p>
-            <a:endParaRPr lang="en-US" dirty="0" smtClean="0"/>
+              <a:t>: The </a:t>
+            </a:r>
+            <a:r>
+              <a:rPr lang="en-US" dirty="0" err="1" smtClean="0"/>
+              <a:t>LiveAuthClient</a:t>
+            </a:r>
+            <a:r>
+              <a:rPr lang="en-US" dirty="0" smtClean="0"/>
+              <a:t> class will</a:t>
+            </a:r>
+            <a:r>
+              <a:rPr lang="en-US" baseline="0" dirty="0" smtClean="0"/>
+              <a:t> initiate the active login. Your code should keep that class in scope, and call its methods to get tokens for subsequent requests.</a:t>
+            </a:r>
+          </a:p>
+          <a:p>
+            <a:endParaRPr lang="en-US" baseline="0" dirty="0" smtClean="0"/>
+          </a:p>
+          <a:p>
+            <a:r>
+              <a:rPr lang="en-US" baseline="0" dirty="0" smtClean="0"/>
+              <a:t>Web: The </a:t>
+            </a:r>
+            <a:r>
+              <a:rPr lang="en-US" baseline="0" dirty="0" err="1" smtClean="0"/>
+              <a:t>LiveAuthClient</a:t>
+            </a:r>
+            <a:r>
+              <a:rPr lang="en-US" baseline="0" dirty="0" smtClean="0"/>
+              <a:t> class has a property (</a:t>
+            </a:r>
+            <a:r>
+              <a:rPr lang="en-US" baseline="0" dirty="0" err="1" smtClean="0"/>
+              <a:t>GetLoginUrl</a:t>
+            </a:r>
+            <a:r>
+              <a:rPr lang="en-US" baseline="0" dirty="0" smtClean="0"/>
+              <a:t>) that will provide the redirect. Once the login/consent happens, you can pass the </a:t>
+            </a:r>
+            <a:r>
+              <a:rPr lang="en-US" baseline="0" dirty="0" err="1" smtClean="0"/>
+              <a:t>HttpContext</a:t>
+            </a:r>
+            <a:r>
+              <a:rPr lang="en-US" baseline="0" dirty="0" smtClean="0"/>
+              <a:t> to the </a:t>
+            </a:r>
+            <a:r>
+              <a:rPr lang="en-US" baseline="0" dirty="0" err="1" smtClean="0"/>
+              <a:t>ExchangeAuthCodeAsync</a:t>
+            </a:r>
+            <a:r>
+              <a:rPr lang="en-US" baseline="0" dirty="0" smtClean="0"/>
+              <a:t> method to exchange the </a:t>
+            </a:r>
+            <a:r>
+              <a:rPr lang="en-US" baseline="0" dirty="0" err="1" smtClean="0"/>
+              <a:t>auth</a:t>
+            </a:r>
+            <a:r>
+              <a:rPr lang="en-US" baseline="0" dirty="0" smtClean="0"/>
+              <a:t> code for a token. (Similar to how the </a:t>
+            </a:r>
+            <a:r>
+              <a:rPr lang="en-US" baseline="0" dirty="0" err="1" smtClean="0"/>
+              <a:t>TokenHelper</a:t>
+            </a:r>
+            <a:r>
+              <a:rPr lang="en-US" baseline="0" dirty="0" smtClean="0"/>
+              <a:t> class will inspect the response for the appropriate </a:t>
+            </a:r>
+            <a:r>
+              <a:rPr lang="en-US" baseline="0" dirty="0" err="1" smtClean="0"/>
+              <a:t>querystring</a:t>
+            </a:r>
+            <a:r>
+              <a:rPr lang="en-US" baseline="0" dirty="0" smtClean="0"/>
+              <a:t> parameters.</a:t>
+            </a:r>
+            <a:endParaRPr lang="en-US" dirty="0"/>
           </a:p>
         </p:txBody>
       </p:sp>
@@ -1965,9 +1966,9 @@
           <a:bodyPr/>
           <a:lstStyle/>
           <a:p>
-            <a:fld id="{83076554-B7F1-4ECF-B249-05F619EE0826}" type="datetime1">
+            <a:fld id="{A818071C-18BB-4FAB-9CAB-23ED91B88EAC}" type="datetime1">
               <a:rPr lang="en-US" smtClean="0"/>
-              <a:t>9/18/2014</a:t>
+              <a:t>10/4/2014</a:t>
             </a:fld>
             <a:endParaRPr lang="en-US"/>
           </a:p>
@@ -1990,7 +1991,7 @@
           <a:p>
             <a:fld id="{B4008EB6-D09E-4580-8CD6-DDB14511944F}" type="slidenum">
               <a:rPr lang="en-US" smtClean="0"/>
-              <a:t>26</a:t>
+              <a:t>15</a:t>
             </a:fld>
             <a:endParaRPr lang="en-US" dirty="0"/>
           </a:p>
@@ -2098,7 +2099,7 @@
     </p:spTree>
     <p:extLst>
       <p:ext uri="{BB962C8B-B14F-4D97-AF65-F5344CB8AC3E}">
-        <p14:creationId xmlns:p14="http://schemas.microsoft.com/office/powerpoint/2010/main" val="1887950778"/>
+        <p14:creationId xmlns:p14="http://schemas.microsoft.com/office/powerpoint/2010/main" val="329781637"/>
       </p:ext>
     </p:extLst>
   </p:cSld>
@@ -2152,70 +2153,112 @@
           <a:bodyPr/>
           <a:lstStyle/>
           <a:p>
-            <a:endParaRPr lang="en-US"/>
+            <a:r>
+              <a:rPr lang="en-US" dirty="0" smtClean="0"/>
+              <a:t>Step 3:</a:t>
+            </a:r>
+            <a:r>
+              <a:rPr lang="en-US" baseline="0" dirty="0" smtClean="0"/>
+              <a:t> Capture the content</a:t>
+            </a:r>
+            <a:endParaRPr lang="en-US" dirty="0"/>
           </a:p>
         </p:txBody>
       </p:sp>
       <p:sp>
         <p:nvSpPr>
-          <p:cNvPr id="4" name="Header Placeholder 3"/>
+          <p:cNvPr id="4" name="Date Placeholder 3"/>
           <p:cNvSpPr>
             <a:spLocks noGrp="1"/>
           </p:cNvSpPr>
           <p:nvPr>
-            <p:ph type="hdr" sz="quarter" idx="10"/>
-          </p:nvPr>
-        </p:nvSpPr>
-        <p:spPr>
-          <a:xfrm>
-            <a:off x="0" y="0"/>
-            <a:ext cx="2971800" cy="457200"/>
-          </a:xfrm>
-          <a:prstGeom prst="rect">
-            <a:avLst/>
-          </a:prstGeom>
-        </p:spPr>
+            <p:ph type="dt" idx="10"/>
+          </p:nvPr>
+        </p:nvSpPr>
+        <p:spPr/>
         <p:txBody>
           <a:bodyPr/>
           <a:lstStyle/>
           <a:p>
-            <a:endParaRPr lang="en-US" dirty="0"/>
+            <a:fld id="{ACE61BA5-5300-46F9-8411-41C679BB1806}" type="datetime1">
+              <a:rPr lang="en-US" smtClean="0"/>
+              <a:t>10/4/2014</a:t>
+            </a:fld>
+            <a:endParaRPr lang="en-US"/>
           </a:p>
         </p:txBody>
       </p:sp>
       <p:sp>
         <p:nvSpPr>
-          <p:cNvPr id="5" name="Footer Placeholder 4"/>
+          <p:cNvPr id="5" name="Slide Number Placeholder 4"/>
           <p:cNvSpPr>
             <a:spLocks noGrp="1"/>
           </p:cNvSpPr>
           <p:nvPr>
-            <p:ph type="ftr" sz="quarter" idx="11"/>
-          </p:nvPr>
-        </p:nvSpPr>
-        <p:spPr>
-          <a:xfrm>
-            <a:off x="0" y="8686800"/>
-            <a:ext cx="5920740" cy="355964"/>
-          </a:xfrm>
-          <a:prstGeom prst="rect">
-            <a:avLst/>
-          </a:prstGeom>
-        </p:spPr>
+            <p:ph type="sldNum" sz="quarter" idx="11"/>
+          </p:nvPr>
+        </p:nvSpPr>
+        <p:spPr/>
         <p:txBody>
           <a:bodyPr/>
           <a:lstStyle/>
           <a:p>
-            <a:pPr defTabSz="914099" eaLnBrk="0" hangingPunct="0"/>
-            <a:r>
-              <a:rPr lang="en-US" sz="400" smtClean="0">
+            <a:fld id="{B4008EB6-D09E-4580-8CD6-DDB14511944F}" type="slidenum">
+              <a:rPr lang="en-US" smtClean="0"/>
+              <a:t>16</a:t>
+            </a:fld>
+            <a:endParaRPr lang="en-US" dirty="0"/>
+          </a:p>
+        </p:txBody>
+      </p:sp>
+      <p:sp>
+        <p:nvSpPr>
+          <p:cNvPr id="6" name="Header Placeholder 5"/>
+          <p:cNvSpPr>
+            <a:spLocks noGrp="1"/>
+          </p:cNvSpPr>
+          <p:nvPr>
+            <p:ph type="hdr" sz="quarter" idx="12"/>
+          </p:nvPr>
+        </p:nvSpPr>
+        <p:spPr/>
+        <p:txBody>
+          <a:bodyPr/>
+          <a:lstStyle/>
+          <a:p>
+            <a:r>
+              <a:rPr lang="en-US" smtClean="0"/>
+              <a:t>Microsoft Office</a:t>
+            </a:r>
+            <a:endParaRPr lang="en-US" dirty="0"/>
+          </a:p>
+        </p:txBody>
+      </p:sp>
+      <p:sp>
+        <p:nvSpPr>
+          <p:cNvPr id="7" name="Footer Placeholder 6"/>
+          <p:cNvSpPr>
+            <a:spLocks noGrp="1"/>
+          </p:cNvSpPr>
+          <p:nvPr>
+            <p:ph type="ftr" sz="quarter" idx="13"/>
+          </p:nvPr>
+        </p:nvSpPr>
+        <p:spPr/>
+        <p:txBody>
+          <a:bodyPr/>
+          <a:lstStyle/>
+          <a:p>
+            <a:pPr marL="231775" defTabSz="914099" eaLnBrk="0" hangingPunct="0"/>
+            <a:r>
+              <a:rPr lang="en-US" sz="500" smtClean="0">
                 <a:gradFill>
                   <a:gsLst>
                     <a:gs pos="0">
-                      <a:prstClr val="black"/>
+                      <a:schemeClr val="tx1"/>
                     </a:gs>
                     <a:gs pos="100000">
-                      <a:prstClr val="black"/>
+                      <a:schemeClr val="tx1"/>
                     </a:gs>
                   </a:gsLst>
                   <a:lin ang="5400000" scaled="0"/>
@@ -2228,16 +2271,16 @@
             </a:r>
           </a:p>
           <a:p>
-            <a:pPr defTabSz="914099" eaLnBrk="0" hangingPunct="0"/>
-            <a:r>
-              <a:rPr lang="en-US" sz="400" smtClean="0">
+            <a:pPr marL="231775" defTabSz="914099" eaLnBrk="0" hangingPunct="0"/>
+            <a:r>
+              <a:rPr lang="en-US" sz="500" smtClean="0">
                 <a:gradFill>
                   <a:gsLst>
                     <a:gs pos="0">
-                      <a:prstClr val="black"/>
+                      <a:schemeClr val="tx1"/>
                     </a:gs>
                     <a:gs pos="100000">
-                      <a:prstClr val="black"/>
+                      <a:schemeClr val="tx1"/>
                     </a:gs>
                   </a:gsLst>
                   <a:lin ang="5400000" scaled="0"/>
@@ -2248,14 +2291,14 @@
               </a:rPr>
               <a:t>The information herein is for informational purposes only and represents the current view of Microsoft Corporation as of the date of this presentation.  Because Microsoft must respond to changing market conditions, it should not be interpreted to be a commitment on the part of Microsoft, and Microsoft cannot guarantee the accuracy of any information provided after the date of this presentation.  MICROSOFT MAKES NO WARRANTIES, EXPRESS, IMPLIED OR STATUTORY, AS TO THE INFORMATION IN THIS PRESENTATION.</a:t>
             </a:r>
-            <a:endParaRPr lang="en-US" sz="400" dirty="0" smtClean="0">
+            <a:endParaRPr lang="en-US" sz="500" dirty="0">
               <a:gradFill>
                 <a:gsLst>
                   <a:gs pos="0">
-                    <a:prstClr val="black"/>
+                    <a:schemeClr val="tx1"/>
                   </a:gs>
                   <a:gs pos="100000">
-                    <a:prstClr val="black"/>
+                    <a:schemeClr val="tx1"/>
                   </a:gs>
                 </a:gsLst>
                 <a:lin ang="5400000" scaled="0"/>
@@ -2267,14 +2310,56 @@
           </a:p>
         </p:txBody>
       </p:sp>
-      <p:sp>
-        <p:nvSpPr>
-          <p:cNvPr id="6" name="Date Placeholder 5"/>
+    </p:spTree>
+    <p:extLst>
+      <p:ext uri="{BB962C8B-B14F-4D97-AF65-F5344CB8AC3E}">
+        <p14:creationId xmlns:p14="http://schemas.microsoft.com/office/powerpoint/2010/main" val="1075756660"/>
+      </p:ext>
+    </p:extLst>
+  </p:cSld>
+  <p:clrMapOvr>
+    <a:masterClrMapping/>
+  </p:clrMapOvr>
+</p:notes>
+</file>
+
+<file path=ppt/notesSlides/notesSlide14.xml><?xml version="1.0" encoding="utf-8"?>
+<p:notes xmlns:a="http://schemas.openxmlformats.org/drawingml/2006/main" xmlns:r="http://schemas.openxmlformats.org/officeDocument/2006/relationships" xmlns:p="http://schemas.openxmlformats.org/presentationml/2006/main">
+  <p:cSld>
+    <p:spTree>
+      <p:nvGrpSpPr>
+        <p:cNvPr id="1" name=""/>
+        <p:cNvGrpSpPr/>
+        <p:nvPr/>
+      </p:nvGrpSpPr>
+      <p:grpSpPr>
+        <a:xfrm>
+          <a:off x="0" y="0"/>
+          <a:ext cx="0" cy="0"/>
+          <a:chOff x="0" y="0"/>
+          <a:chExt cx="0" cy="0"/>
+        </a:xfrm>
+      </p:grpSpPr>
+      <p:sp>
+        <p:nvSpPr>
+          <p:cNvPr id="2" name="Slide Image Placeholder 1"/>
+          <p:cNvSpPr>
+            <a:spLocks noGrp="1" noRot="1" noChangeAspect="1"/>
+          </p:cNvSpPr>
+          <p:nvPr>
+            <p:ph type="sldImg"/>
+          </p:nvPr>
+        </p:nvSpPr>
+        <p:spPr/>
+      </p:sp>
+      <p:sp>
+        <p:nvSpPr>
+          <p:cNvPr id="3" name="Notes Placeholder 2"/>
           <p:cNvSpPr>
             <a:spLocks noGrp="1"/>
           </p:cNvSpPr>
           <p:nvPr>
-            <p:ph type="dt" idx="12"/>
+            <p:ph type="body" idx="1"/>
           </p:nvPr>
         </p:nvSpPr>
         <p:spPr/>
@@ -2282,22 +2367,22 @@
           <a:bodyPr/>
           <a:lstStyle/>
           <a:p>
-            <a:fld id="{0BB6559B-C68D-49B4-97AE-9BB74C417927}" type="datetime1">
-              <a:rPr lang="en-US" smtClean="0"/>
-              <a:t>9/18/2014</a:t>
-            </a:fld>
-            <a:endParaRPr lang="en-US"/>
+            <a:r>
+              <a:rPr lang="en-US" dirty="0" smtClean="0"/>
+              <a:t>Step 4: Send content to OneNote</a:t>
+            </a:r>
+            <a:endParaRPr lang="en-US" dirty="0"/>
           </a:p>
         </p:txBody>
       </p:sp>
       <p:sp>
         <p:nvSpPr>
-          <p:cNvPr id="7" name="Slide Number Placeholder 6"/>
+          <p:cNvPr id="4" name="Date Placeholder 3"/>
           <p:cNvSpPr>
             <a:spLocks noGrp="1"/>
           </p:cNvSpPr>
           <p:nvPr>
-            <p:ph type="sldNum" sz="quarter" idx="13"/>
+            <p:ph type="dt" idx="10"/>
           </p:nvPr>
         </p:nvSpPr>
         <p:spPr/>
@@ -2305,18 +2390,1346 @@
           <a:bodyPr/>
           <a:lstStyle/>
           <a:p>
+            <a:fld id="{F3DA1B79-7F74-41BE-A51E-49DEDDD9A375}" type="datetime1">
+              <a:rPr lang="en-US" smtClean="0"/>
+              <a:t>10/4/2014</a:t>
+            </a:fld>
+            <a:endParaRPr lang="en-US"/>
+          </a:p>
+        </p:txBody>
+      </p:sp>
+      <p:sp>
+        <p:nvSpPr>
+          <p:cNvPr id="5" name="Slide Number Placeholder 4"/>
+          <p:cNvSpPr>
+            <a:spLocks noGrp="1"/>
+          </p:cNvSpPr>
+          <p:nvPr>
+            <p:ph type="sldNum" sz="quarter" idx="11"/>
+          </p:nvPr>
+        </p:nvSpPr>
+        <p:spPr/>
+        <p:txBody>
+          <a:bodyPr/>
+          <a:lstStyle/>
+          <a:p>
             <a:fld id="{B4008EB6-D09E-4580-8CD6-DDB14511944F}" type="slidenum">
               <a:rPr lang="en-US" smtClean="0"/>
-              <a:t>30</a:t>
+              <a:t>17</a:t>
             </a:fld>
             <a:endParaRPr lang="en-US" dirty="0"/>
+          </a:p>
+        </p:txBody>
+      </p:sp>
+      <p:sp>
+        <p:nvSpPr>
+          <p:cNvPr id="6" name="Header Placeholder 5"/>
+          <p:cNvSpPr>
+            <a:spLocks noGrp="1"/>
+          </p:cNvSpPr>
+          <p:nvPr>
+            <p:ph type="hdr" sz="quarter" idx="12"/>
+          </p:nvPr>
+        </p:nvSpPr>
+        <p:spPr/>
+        <p:txBody>
+          <a:bodyPr/>
+          <a:lstStyle/>
+          <a:p>
+            <a:r>
+              <a:rPr lang="en-US" smtClean="0"/>
+              <a:t>Microsoft Office</a:t>
+            </a:r>
+            <a:endParaRPr lang="en-US" dirty="0"/>
+          </a:p>
+        </p:txBody>
+      </p:sp>
+      <p:sp>
+        <p:nvSpPr>
+          <p:cNvPr id="7" name="Footer Placeholder 6"/>
+          <p:cNvSpPr>
+            <a:spLocks noGrp="1"/>
+          </p:cNvSpPr>
+          <p:nvPr>
+            <p:ph type="ftr" sz="quarter" idx="13"/>
+          </p:nvPr>
+        </p:nvSpPr>
+        <p:spPr/>
+        <p:txBody>
+          <a:bodyPr/>
+          <a:lstStyle/>
+          <a:p>
+            <a:pPr marL="231775" defTabSz="914099" eaLnBrk="0" hangingPunct="0"/>
+            <a:r>
+              <a:rPr lang="en-US" sz="500" smtClean="0">
+                <a:gradFill>
+                  <a:gsLst>
+                    <a:gs pos="0">
+                      <a:schemeClr val="tx1"/>
+                    </a:gs>
+                    <a:gs pos="100000">
+                      <a:schemeClr val="tx1"/>
+                    </a:gs>
+                  </a:gsLst>
+                  <a:lin ang="5400000" scaled="0"/>
+                </a:gradFill>
+                <a:latin typeface="Segoe UI" pitchFamily="34" charset="0"/>
+                <a:ea typeface="Segoe UI" pitchFamily="34" charset="0"/>
+                <a:cs typeface="Segoe UI" pitchFamily="34" charset="0"/>
+              </a:rPr>
+              <a:t>© 2012 Microsoft Corporation. All rights reserved. Microsoft, Windows, and other product names are or may be registered trademarks and/or trademarks in the U.S. and/or other countries.</a:t>
+            </a:r>
+          </a:p>
+          <a:p>
+            <a:pPr marL="231775" defTabSz="914099" eaLnBrk="0" hangingPunct="0"/>
+            <a:r>
+              <a:rPr lang="en-US" sz="500" smtClean="0">
+                <a:gradFill>
+                  <a:gsLst>
+                    <a:gs pos="0">
+                      <a:schemeClr val="tx1"/>
+                    </a:gs>
+                    <a:gs pos="100000">
+                      <a:schemeClr val="tx1"/>
+                    </a:gs>
+                  </a:gsLst>
+                  <a:lin ang="5400000" scaled="0"/>
+                </a:gradFill>
+                <a:latin typeface="Segoe UI" pitchFamily="34" charset="0"/>
+                <a:ea typeface="Segoe UI" pitchFamily="34" charset="0"/>
+                <a:cs typeface="Segoe UI" pitchFamily="34" charset="0"/>
+              </a:rPr>
+              <a:t>The information herein is for informational purposes only and represents the current view of Microsoft Corporation as of the date of this presentation.  Because Microsoft must respond to changing market conditions, it should not be interpreted to be a commitment on the part of Microsoft, and Microsoft cannot guarantee the accuracy of any information provided after the date of this presentation.  MICROSOFT MAKES NO WARRANTIES, EXPRESS, IMPLIED OR STATUTORY, AS TO THE INFORMATION IN THIS PRESENTATION.</a:t>
+            </a:r>
+            <a:endParaRPr lang="en-US" sz="500" dirty="0">
+              <a:gradFill>
+                <a:gsLst>
+                  <a:gs pos="0">
+                    <a:schemeClr val="tx1"/>
+                  </a:gs>
+                  <a:gs pos="100000">
+                    <a:schemeClr val="tx1"/>
+                  </a:gs>
+                </a:gsLst>
+                <a:lin ang="5400000" scaled="0"/>
+              </a:gradFill>
+              <a:latin typeface="Segoe UI" pitchFamily="34" charset="0"/>
+              <a:ea typeface="Segoe UI" pitchFamily="34" charset="0"/>
+              <a:cs typeface="Segoe UI" pitchFamily="34" charset="0"/>
+            </a:endParaRPr>
           </a:p>
         </p:txBody>
       </p:sp>
     </p:spTree>
     <p:extLst>
       <p:ext uri="{BB962C8B-B14F-4D97-AF65-F5344CB8AC3E}">
-        <p14:creationId xmlns:p14="http://schemas.microsoft.com/office/powerpoint/2010/main" val="3695926200"/>
+        <p14:creationId xmlns:p14="http://schemas.microsoft.com/office/powerpoint/2010/main" val="1593538760"/>
+      </p:ext>
+    </p:extLst>
+  </p:cSld>
+  <p:clrMapOvr>
+    <a:masterClrMapping/>
+  </p:clrMapOvr>
+</p:notes>
+</file>
+
+<file path=ppt/notesSlides/notesSlide15.xml><?xml version="1.0" encoding="utf-8"?>
+<p:notes xmlns:a="http://schemas.openxmlformats.org/drawingml/2006/main" xmlns:r="http://schemas.openxmlformats.org/officeDocument/2006/relationships" xmlns:p="http://schemas.openxmlformats.org/presentationml/2006/main">
+  <p:cSld>
+    <p:spTree>
+      <p:nvGrpSpPr>
+        <p:cNvPr id="1" name=""/>
+        <p:cNvGrpSpPr/>
+        <p:nvPr/>
+      </p:nvGrpSpPr>
+      <p:grpSpPr>
+        <a:xfrm>
+          <a:off x="0" y="0"/>
+          <a:ext cx="0" cy="0"/>
+          <a:chOff x="0" y="0"/>
+          <a:chExt cx="0" cy="0"/>
+        </a:xfrm>
+      </p:grpSpPr>
+      <p:sp>
+        <p:nvSpPr>
+          <p:cNvPr id="2" name="Slide Image Placeholder 1"/>
+          <p:cNvSpPr>
+            <a:spLocks noGrp="1" noRot="1" noChangeAspect="1"/>
+          </p:cNvSpPr>
+          <p:nvPr>
+            <p:ph type="sldImg"/>
+          </p:nvPr>
+        </p:nvSpPr>
+        <p:spPr/>
+      </p:sp>
+      <p:sp>
+        <p:nvSpPr>
+          <p:cNvPr id="3" name="Notes Placeholder 2"/>
+          <p:cNvSpPr>
+            <a:spLocks noGrp="1"/>
+          </p:cNvSpPr>
+          <p:nvPr>
+            <p:ph type="body" idx="1"/>
+          </p:nvPr>
+        </p:nvSpPr>
+        <p:spPr/>
+        <p:txBody>
+          <a:bodyPr/>
+          <a:lstStyle/>
+          <a:p>
+            <a:pPr marL="107152" lvl="1" indent="0">
+              <a:buNone/>
+            </a:pPr>
+            <a:r>
+              <a:rPr lang="en-US" dirty="0" smtClean="0"/>
+              <a:t>https://apigee.com/onenote/embed/console/onenote/</a:t>
+            </a:r>
+            <a:endParaRPr lang="en-US" dirty="0"/>
+          </a:p>
+        </p:txBody>
+      </p:sp>
+      <p:sp>
+        <p:nvSpPr>
+          <p:cNvPr id="4" name="Date Placeholder 3"/>
+          <p:cNvSpPr>
+            <a:spLocks noGrp="1"/>
+          </p:cNvSpPr>
+          <p:nvPr>
+            <p:ph type="dt" idx="10"/>
+          </p:nvPr>
+        </p:nvSpPr>
+        <p:spPr/>
+        <p:txBody>
+          <a:bodyPr/>
+          <a:lstStyle/>
+          <a:p>
+            <a:fld id="{6B8BF90D-BD61-43D7-93E0-6CBEC8B2313A}" type="datetime1">
+              <a:rPr lang="en-US" smtClean="0"/>
+              <a:t>10/4/2014</a:t>
+            </a:fld>
+            <a:endParaRPr lang="en-US"/>
+          </a:p>
+        </p:txBody>
+      </p:sp>
+      <p:sp>
+        <p:nvSpPr>
+          <p:cNvPr id="5" name="Slide Number Placeholder 4"/>
+          <p:cNvSpPr>
+            <a:spLocks noGrp="1"/>
+          </p:cNvSpPr>
+          <p:nvPr>
+            <p:ph type="sldNum" sz="quarter" idx="11"/>
+          </p:nvPr>
+        </p:nvSpPr>
+        <p:spPr/>
+        <p:txBody>
+          <a:bodyPr/>
+          <a:lstStyle/>
+          <a:p>
+            <a:fld id="{B4008EB6-D09E-4580-8CD6-DDB14511944F}" type="slidenum">
+              <a:rPr lang="en-US" smtClean="0"/>
+              <a:t>20</a:t>
+            </a:fld>
+            <a:endParaRPr lang="en-US" dirty="0"/>
+          </a:p>
+        </p:txBody>
+      </p:sp>
+      <p:sp>
+        <p:nvSpPr>
+          <p:cNvPr id="6" name="Header Placeholder 5"/>
+          <p:cNvSpPr>
+            <a:spLocks noGrp="1"/>
+          </p:cNvSpPr>
+          <p:nvPr>
+            <p:ph type="hdr" sz="quarter" idx="12"/>
+          </p:nvPr>
+        </p:nvSpPr>
+        <p:spPr/>
+        <p:txBody>
+          <a:bodyPr/>
+          <a:lstStyle/>
+          <a:p>
+            <a:r>
+              <a:rPr lang="en-US" smtClean="0"/>
+              <a:t>Microsoft Office</a:t>
+            </a:r>
+            <a:endParaRPr lang="en-US" dirty="0"/>
+          </a:p>
+        </p:txBody>
+      </p:sp>
+      <p:sp>
+        <p:nvSpPr>
+          <p:cNvPr id="7" name="Footer Placeholder 6"/>
+          <p:cNvSpPr>
+            <a:spLocks noGrp="1"/>
+          </p:cNvSpPr>
+          <p:nvPr>
+            <p:ph type="ftr" sz="quarter" idx="13"/>
+          </p:nvPr>
+        </p:nvSpPr>
+        <p:spPr/>
+        <p:txBody>
+          <a:bodyPr/>
+          <a:lstStyle/>
+          <a:p>
+            <a:pPr marL="231775" defTabSz="914099" eaLnBrk="0" hangingPunct="0"/>
+            <a:r>
+              <a:rPr lang="en-US" sz="500" smtClean="0">
+                <a:gradFill>
+                  <a:gsLst>
+                    <a:gs pos="0">
+                      <a:schemeClr val="tx1"/>
+                    </a:gs>
+                    <a:gs pos="100000">
+                      <a:schemeClr val="tx1"/>
+                    </a:gs>
+                  </a:gsLst>
+                  <a:lin ang="5400000" scaled="0"/>
+                </a:gradFill>
+                <a:latin typeface="Segoe UI" pitchFamily="34" charset="0"/>
+                <a:ea typeface="Segoe UI" pitchFamily="34" charset="0"/>
+                <a:cs typeface="Segoe UI" pitchFamily="34" charset="0"/>
+              </a:rPr>
+              <a:t>© 2012 Microsoft Corporation. All rights reserved. Microsoft, Windows, and other product names are or may be registered trademarks and/or trademarks in the U.S. and/or other countries.</a:t>
+            </a:r>
+          </a:p>
+          <a:p>
+            <a:pPr marL="231775" defTabSz="914099" eaLnBrk="0" hangingPunct="0"/>
+            <a:r>
+              <a:rPr lang="en-US" sz="500" smtClean="0">
+                <a:gradFill>
+                  <a:gsLst>
+                    <a:gs pos="0">
+                      <a:schemeClr val="tx1"/>
+                    </a:gs>
+                    <a:gs pos="100000">
+                      <a:schemeClr val="tx1"/>
+                    </a:gs>
+                  </a:gsLst>
+                  <a:lin ang="5400000" scaled="0"/>
+                </a:gradFill>
+                <a:latin typeface="Segoe UI" pitchFamily="34" charset="0"/>
+                <a:ea typeface="Segoe UI" pitchFamily="34" charset="0"/>
+                <a:cs typeface="Segoe UI" pitchFamily="34" charset="0"/>
+              </a:rPr>
+              <a:t>The information herein is for informational purposes only and represents the current view of Microsoft Corporation as of the date of this presentation.  Because Microsoft must respond to changing market conditions, it should not be interpreted to be a commitment on the part of Microsoft, and Microsoft cannot guarantee the accuracy of any information provided after the date of this presentation.  MICROSOFT MAKES NO WARRANTIES, EXPRESS, IMPLIED OR STATUTORY, AS TO THE INFORMATION IN THIS PRESENTATION.</a:t>
+            </a:r>
+            <a:endParaRPr lang="en-US" sz="500" dirty="0">
+              <a:gradFill>
+                <a:gsLst>
+                  <a:gs pos="0">
+                    <a:schemeClr val="tx1"/>
+                  </a:gs>
+                  <a:gs pos="100000">
+                    <a:schemeClr val="tx1"/>
+                  </a:gs>
+                </a:gsLst>
+                <a:lin ang="5400000" scaled="0"/>
+              </a:gradFill>
+              <a:latin typeface="Segoe UI" pitchFamily="34" charset="0"/>
+              <a:ea typeface="Segoe UI" pitchFamily="34" charset="0"/>
+              <a:cs typeface="Segoe UI" pitchFamily="34" charset="0"/>
+            </a:endParaRPr>
+          </a:p>
+        </p:txBody>
+      </p:sp>
+    </p:spTree>
+    <p:extLst>
+      <p:ext uri="{BB962C8B-B14F-4D97-AF65-F5344CB8AC3E}">
+        <p14:creationId xmlns:p14="http://schemas.microsoft.com/office/powerpoint/2010/main" val="1588160795"/>
+      </p:ext>
+    </p:extLst>
+  </p:cSld>
+  <p:clrMapOvr>
+    <a:masterClrMapping/>
+  </p:clrMapOvr>
+</p:notes>
+</file>
+
+<file path=ppt/notesSlides/notesSlide16.xml><?xml version="1.0" encoding="utf-8"?>
+<p:notes xmlns:a="http://schemas.openxmlformats.org/drawingml/2006/main" xmlns:r="http://schemas.openxmlformats.org/officeDocument/2006/relationships" xmlns:p="http://schemas.openxmlformats.org/presentationml/2006/main">
+  <p:cSld>
+    <p:spTree>
+      <p:nvGrpSpPr>
+        <p:cNvPr id="1" name=""/>
+        <p:cNvGrpSpPr/>
+        <p:nvPr/>
+      </p:nvGrpSpPr>
+      <p:grpSpPr>
+        <a:xfrm>
+          <a:off x="0" y="0"/>
+          <a:ext cx="0" cy="0"/>
+          <a:chOff x="0" y="0"/>
+          <a:chExt cx="0" cy="0"/>
+        </a:xfrm>
+      </p:grpSpPr>
+      <p:sp>
+        <p:nvSpPr>
+          <p:cNvPr id="2" name="Slide Image Placeholder 1"/>
+          <p:cNvSpPr>
+            <a:spLocks noGrp="1" noRot="1" noChangeAspect="1"/>
+          </p:cNvSpPr>
+          <p:nvPr>
+            <p:ph type="sldImg"/>
+          </p:nvPr>
+        </p:nvSpPr>
+        <p:spPr/>
+      </p:sp>
+      <p:sp>
+        <p:nvSpPr>
+          <p:cNvPr id="3" name="Notes Placeholder 2"/>
+          <p:cNvSpPr>
+            <a:spLocks noGrp="1"/>
+          </p:cNvSpPr>
+          <p:nvPr>
+            <p:ph type="body" idx="1"/>
+          </p:nvPr>
+        </p:nvSpPr>
+        <p:spPr/>
+        <p:txBody>
+          <a:bodyPr/>
+          <a:lstStyle/>
+          <a:p>
+            <a:r>
+              <a:rPr lang="en-US" dirty="0" smtClean="0"/>
+              <a:t>This</a:t>
+            </a:r>
+            <a:r>
+              <a:rPr lang="en-US" baseline="0" dirty="0" smtClean="0"/>
+              <a:t> snippet represents a simple text capture.</a:t>
+            </a:r>
+          </a:p>
+          <a:p>
+            <a:endParaRPr lang="en-US" baseline="0" dirty="0" smtClean="0"/>
+          </a:p>
+          <a:p>
+            <a:r>
+              <a:rPr lang="en-US" baseline="0" dirty="0" smtClean="0"/>
+              <a:t>In addition, it provides the basic structure that the following snippets will build upon:</a:t>
+            </a:r>
+          </a:p>
+          <a:p>
+            <a:pPr marL="171450" indent="-171450">
+              <a:buFontTx/>
+              <a:buChar char="-"/>
+            </a:pPr>
+            <a:r>
+              <a:rPr lang="en-US" baseline="0" dirty="0" smtClean="0"/>
+              <a:t>Create an </a:t>
+            </a:r>
+            <a:r>
+              <a:rPr lang="en-US" baseline="0" dirty="0" err="1" smtClean="0"/>
+              <a:t>HttpClient</a:t>
+            </a:r>
+            <a:endParaRPr lang="en-US" baseline="0" dirty="0" smtClean="0"/>
+          </a:p>
+          <a:p>
+            <a:pPr marL="171450" indent="-171450">
+              <a:buFontTx/>
+              <a:buChar char="-"/>
+            </a:pPr>
+            <a:r>
+              <a:rPr lang="en-US" baseline="0" dirty="0" smtClean="0"/>
+              <a:t>Set the Headers</a:t>
+            </a:r>
+          </a:p>
+          <a:p>
+            <a:pPr marL="171450" indent="-171450">
+              <a:buFontTx/>
+              <a:buChar char="-"/>
+            </a:pPr>
+            <a:r>
+              <a:rPr lang="en-US" baseline="0" dirty="0" smtClean="0"/>
+              <a:t>Build the content for the to-be-created page</a:t>
+            </a:r>
+          </a:p>
+          <a:p>
+            <a:pPr marL="171450" indent="-171450">
+              <a:buFontTx/>
+              <a:buChar char="-"/>
+            </a:pPr>
+            <a:r>
+              <a:rPr lang="en-US" baseline="0" dirty="0" smtClean="0"/>
+              <a:t>Post to the endpoint</a:t>
+            </a:r>
+            <a:endParaRPr lang="en-US" dirty="0"/>
+          </a:p>
+        </p:txBody>
+      </p:sp>
+      <p:sp>
+        <p:nvSpPr>
+          <p:cNvPr id="4" name="Date Placeholder 3"/>
+          <p:cNvSpPr>
+            <a:spLocks noGrp="1"/>
+          </p:cNvSpPr>
+          <p:nvPr>
+            <p:ph type="dt" idx="10"/>
+          </p:nvPr>
+        </p:nvSpPr>
+        <p:spPr/>
+        <p:txBody>
+          <a:bodyPr/>
+          <a:lstStyle/>
+          <a:p>
+            <a:fld id="{4AED148B-7CB7-405A-AC08-8A9064AA46CA}" type="datetime1">
+              <a:rPr lang="en-US" smtClean="0"/>
+              <a:t>10/4/2014</a:t>
+            </a:fld>
+            <a:endParaRPr lang="en-US"/>
+          </a:p>
+        </p:txBody>
+      </p:sp>
+      <p:sp>
+        <p:nvSpPr>
+          <p:cNvPr id="5" name="Slide Number Placeholder 4"/>
+          <p:cNvSpPr>
+            <a:spLocks noGrp="1"/>
+          </p:cNvSpPr>
+          <p:nvPr>
+            <p:ph type="sldNum" sz="quarter" idx="11"/>
+          </p:nvPr>
+        </p:nvSpPr>
+        <p:spPr/>
+        <p:txBody>
+          <a:bodyPr/>
+          <a:lstStyle/>
+          <a:p>
+            <a:fld id="{B4008EB6-D09E-4580-8CD6-DDB14511944F}" type="slidenum">
+              <a:rPr lang="en-US" smtClean="0"/>
+              <a:t>23</a:t>
+            </a:fld>
+            <a:endParaRPr lang="en-US" dirty="0"/>
+          </a:p>
+        </p:txBody>
+      </p:sp>
+      <p:sp>
+        <p:nvSpPr>
+          <p:cNvPr id="6" name="Header Placeholder 5"/>
+          <p:cNvSpPr>
+            <a:spLocks noGrp="1"/>
+          </p:cNvSpPr>
+          <p:nvPr>
+            <p:ph type="hdr" sz="quarter" idx="12"/>
+          </p:nvPr>
+        </p:nvSpPr>
+        <p:spPr/>
+        <p:txBody>
+          <a:bodyPr/>
+          <a:lstStyle/>
+          <a:p>
+            <a:r>
+              <a:rPr lang="en-US" smtClean="0"/>
+              <a:t>Microsoft Office</a:t>
+            </a:r>
+            <a:endParaRPr lang="en-US" dirty="0"/>
+          </a:p>
+        </p:txBody>
+      </p:sp>
+      <p:sp>
+        <p:nvSpPr>
+          <p:cNvPr id="7" name="Footer Placeholder 6"/>
+          <p:cNvSpPr>
+            <a:spLocks noGrp="1"/>
+          </p:cNvSpPr>
+          <p:nvPr>
+            <p:ph type="ftr" sz="quarter" idx="13"/>
+          </p:nvPr>
+        </p:nvSpPr>
+        <p:spPr/>
+        <p:txBody>
+          <a:bodyPr/>
+          <a:lstStyle/>
+          <a:p>
+            <a:pPr marL="231775" defTabSz="914099" eaLnBrk="0" hangingPunct="0"/>
+            <a:r>
+              <a:rPr lang="en-US" sz="500" smtClean="0">
+                <a:gradFill>
+                  <a:gsLst>
+                    <a:gs pos="0">
+                      <a:schemeClr val="tx1"/>
+                    </a:gs>
+                    <a:gs pos="100000">
+                      <a:schemeClr val="tx1"/>
+                    </a:gs>
+                  </a:gsLst>
+                  <a:lin ang="5400000" scaled="0"/>
+                </a:gradFill>
+                <a:latin typeface="Segoe UI" pitchFamily="34" charset="0"/>
+                <a:ea typeface="Segoe UI" pitchFamily="34" charset="0"/>
+                <a:cs typeface="Segoe UI" pitchFamily="34" charset="0"/>
+              </a:rPr>
+              <a:t>© 2012 Microsoft Corporation. All rights reserved. Microsoft, Windows, and other product names are or may be registered trademarks and/or trademarks in the U.S. and/or other countries.</a:t>
+            </a:r>
+          </a:p>
+          <a:p>
+            <a:pPr marL="231775" defTabSz="914099" eaLnBrk="0" hangingPunct="0"/>
+            <a:r>
+              <a:rPr lang="en-US" sz="500" smtClean="0">
+                <a:gradFill>
+                  <a:gsLst>
+                    <a:gs pos="0">
+                      <a:schemeClr val="tx1"/>
+                    </a:gs>
+                    <a:gs pos="100000">
+                      <a:schemeClr val="tx1"/>
+                    </a:gs>
+                  </a:gsLst>
+                  <a:lin ang="5400000" scaled="0"/>
+                </a:gradFill>
+                <a:latin typeface="Segoe UI" pitchFamily="34" charset="0"/>
+                <a:ea typeface="Segoe UI" pitchFamily="34" charset="0"/>
+                <a:cs typeface="Segoe UI" pitchFamily="34" charset="0"/>
+              </a:rPr>
+              <a:t>The information herein is for informational purposes only and represents the current view of Microsoft Corporation as of the date of this presentation.  Because Microsoft must respond to changing market conditions, it should not be interpreted to be a commitment on the part of Microsoft, and Microsoft cannot guarantee the accuracy of any information provided after the date of this presentation.  MICROSOFT MAKES NO WARRANTIES, EXPRESS, IMPLIED OR STATUTORY, AS TO THE INFORMATION IN THIS PRESENTATION.</a:t>
+            </a:r>
+            <a:endParaRPr lang="en-US" sz="500" dirty="0">
+              <a:gradFill>
+                <a:gsLst>
+                  <a:gs pos="0">
+                    <a:schemeClr val="tx1"/>
+                  </a:gs>
+                  <a:gs pos="100000">
+                    <a:schemeClr val="tx1"/>
+                  </a:gs>
+                </a:gsLst>
+                <a:lin ang="5400000" scaled="0"/>
+              </a:gradFill>
+              <a:latin typeface="Segoe UI" pitchFamily="34" charset="0"/>
+              <a:ea typeface="Segoe UI" pitchFamily="34" charset="0"/>
+              <a:cs typeface="Segoe UI" pitchFamily="34" charset="0"/>
+            </a:endParaRPr>
+          </a:p>
+        </p:txBody>
+      </p:sp>
+    </p:spTree>
+    <p:extLst>
+      <p:ext uri="{BB962C8B-B14F-4D97-AF65-F5344CB8AC3E}">
+        <p14:creationId xmlns:p14="http://schemas.microsoft.com/office/powerpoint/2010/main" val="2492462827"/>
+      </p:ext>
+    </p:extLst>
+  </p:cSld>
+  <p:clrMapOvr>
+    <a:masterClrMapping/>
+  </p:clrMapOvr>
+</p:notes>
+</file>
+
+<file path=ppt/notesSlides/notesSlide17.xml><?xml version="1.0" encoding="utf-8"?>
+<p:notes xmlns:a="http://schemas.openxmlformats.org/drawingml/2006/main" xmlns:r="http://schemas.openxmlformats.org/officeDocument/2006/relationships" xmlns:p="http://schemas.openxmlformats.org/presentationml/2006/main">
+  <p:cSld>
+    <p:spTree>
+      <p:nvGrpSpPr>
+        <p:cNvPr id="1" name=""/>
+        <p:cNvGrpSpPr/>
+        <p:nvPr/>
+      </p:nvGrpSpPr>
+      <p:grpSpPr>
+        <a:xfrm>
+          <a:off x="0" y="0"/>
+          <a:ext cx="0" cy="0"/>
+          <a:chOff x="0" y="0"/>
+          <a:chExt cx="0" cy="0"/>
+        </a:xfrm>
+      </p:grpSpPr>
+      <p:sp>
+        <p:nvSpPr>
+          <p:cNvPr id="2" name="Slide Image Placeholder 1"/>
+          <p:cNvSpPr>
+            <a:spLocks noGrp="1" noRot="1" noChangeAspect="1"/>
+          </p:cNvSpPr>
+          <p:nvPr>
+            <p:ph type="sldImg"/>
+          </p:nvPr>
+        </p:nvSpPr>
+        <p:spPr/>
+      </p:sp>
+      <p:sp>
+        <p:nvSpPr>
+          <p:cNvPr id="3" name="Notes Placeholder 2"/>
+          <p:cNvSpPr>
+            <a:spLocks noGrp="1"/>
+          </p:cNvSpPr>
+          <p:nvPr>
+            <p:ph type="body" idx="1"/>
+          </p:nvPr>
+        </p:nvSpPr>
+        <p:spPr/>
+        <p:txBody>
+          <a:bodyPr/>
+          <a:lstStyle/>
+          <a:p>
+            <a:r>
+              <a:rPr lang="en-US" dirty="0" smtClean="0"/>
+              <a:t>Capturing</a:t>
+            </a:r>
+            <a:r>
+              <a:rPr lang="en-US" baseline="0" dirty="0" smtClean="0"/>
+              <a:t> an image requires </a:t>
+            </a:r>
+            <a:r>
+              <a:rPr lang="en-US" baseline="0" dirty="0" err="1" smtClean="0"/>
+              <a:t>MultipartFormDataContent</a:t>
+            </a:r>
+            <a:r>
+              <a:rPr lang="en-US" baseline="0" dirty="0" smtClean="0"/>
+              <a:t>. The “src” attribute of the&lt;</a:t>
+            </a:r>
+            <a:r>
+              <a:rPr lang="en-US" baseline="0" dirty="0" err="1" smtClean="0"/>
+              <a:t>img</a:t>
+            </a:r>
+            <a:r>
+              <a:rPr lang="en-US" baseline="0" dirty="0" smtClean="0"/>
+              <a:t>&gt; tag has a specific protocol and value.</a:t>
+            </a:r>
+          </a:p>
+          <a:p>
+            <a:endParaRPr lang="en-US" baseline="0" dirty="0" smtClean="0"/>
+          </a:p>
+          <a:p>
+            <a:r>
+              <a:rPr lang="en-US" baseline="0" dirty="0" smtClean="0"/>
+              <a:t>The protocol “name:” indicates the image is contained in another part of the Form Data with the given name (“image1” in this example).</a:t>
+            </a:r>
+          </a:p>
+          <a:p>
+            <a:endParaRPr lang="en-US" baseline="0" dirty="0" smtClean="0"/>
+          </a:p>
+          <a:p>
+            <a:r>
+              <a:rPr lang="en-US" baseline="0" dirty="0" smtClean="0"/>
+              <a:t>Point out the names of the content in the </a:t>
+            </a:r>
+            <a:r>
+              <a:rPr lang="en-US" baseline="0" dirty="0" err="1" smtClean="0"/>
+              <a:t>MultipartFormDataContent</a:t>
+            </a:r>
+            <a:r>
+              <a:rPr lang="en-US" baseline="0" dirty="0" smtClean="0"/>
+              <a:t>. The string content (the html) is named “Presentation” and the image bytes are named the same as the value in the src attribute of the &lt;</a:t>
+            </a:r>
+            <a:r>
+              <a:rPr lang="en-US" baseline="0" dirty="0" err="1" smtClean="0"/>
+              <a:t>img</a:t>
+            </a:r>
+            <a:r>
+              <a:rPr lang="en-US" baseline="0" dirty="0" smtClean="0"/>
+              <a:t>&gt; tag.</a:t>
+            </a:r>
+          </a:p>
+          <a:p>
+            <a:endParaRPr lang="en-US" baseline="0" dirty="0" smtClean="0"/>
+          </a:p>
+          <a:p>
+            <a:r>
+              <a:rPr lang="en-US" baseline="0" dirty="0" smtClean="0"/>
+              <a:t>The name “Presentation” is required – indicates the main part of the capture.</a:t>
+            </a:r>
+          </a:p>
+          <a:p>
+            <a:endParaRPr lang="en-US" dirty="0" smtClean="0"/>
+          </a:p>
+          <a:p>
+            <a:endParaRPr lang="en-US" dirty="0"/>
+          </a:p>
+        </p:txBody>
+      </p:sp>
+      <p:sp>
+        <p:nvSpPr>
+          <p:cNvPr id="4" name="Date Placeholder 3"/>
+          <p:cNvSpPr>
+            <a:spLocks noGrp="1"/>
+          </p:cNvSpPr>
+          <p:nvPr>
+            <p:ph type="dt" idx="10"/>
+          </p:nvPr>
+        </p:nvSpPr>
+        <p:spPr/>
+        <p:txBody>
+          <a:bodyPr/>
+          <a:lstStyle/>
+          <a:p>
+            <a:fld id="{BAA480A6-A57E-488B-9D67-747E5D1E1440}" type="datetime1">
+              <a:rPr lang="en-US" smtClean="0"/>
+              <a:t>10/4/2014</a:t>
+            </a:fld>
+            <a:endParaRPr lang="en-US"/>
+          </a:p>
+        </p:txBody>
+      </p:sp>
+      <p:sp>
+        <p:nvSpPr>
+          <p:cNvPr id="5" name="Slide Number Placeholder 4"/>
+          <p:cNvSpPr>
+            <a:spLocks noGrp="1"/>
+          </p:cNvSpPr>
+          <p:nvPr>
+            <p:ph type="sldNum" sz="quarter" idx="11"/>
+          </p:nvPr>
+        </p:nvSpPr>
+        <p:spPr/>
+        <p:txBody>
+          <a:bodyPr/>
+          <a:lstStyle/>
+          <a:p>
+            <a:fld id="{B4008EB6-D09E-4580-8CD6-DDB14511944F}" type="slidenum">
+              <a:rPr lang="en-US" smtClean="0"/>
+              <a:t>24</a:t>
+            </a:fld>
+            <a:endParaRPr lang="en-US" dirty="0"/>
+          </a:p>
+        </p:txBody>
+      </p:sp>
+      <p:sp>
+        <p:nvSpPr>
+          <p:cNvPr id="6" name="Header Placeholder 5"/>
+          <p:cNvSpPr>
+            <a:spLocks noGrp="1"/>
+          </p:cNvSpPr>
+          <p:nvPr>
+            <p:ph type="hdr" sz="quarter" idx="12"/>
+          </p:nvPr>
+        </p:nvSpPr>
+        <p:spPr/>
+        <p:txBody>
+          <a:bodyPr/>
+          <a:lstStyle/>
+          <a:p>
+            <a:r>
+              <a:rPr lang="en-US" smtClean="0"/>
+              <a:t>Microsoft Office</a:t>
+            </a:r>
+            <a:endParaRPr lang="en-US" dirty="0"/>
+          </a:p>
+        </p:txBody>
+      </p:sp>
+      <p:sp>
+        <p:nvSpPr>
+          <p:cNvPr id="7" name="Footer Placeholder 6"/>
+          <p:cNvSpPr>
+            <a:spLocks noGrp="1"/>
+          </p:cNvSpPr>
+          <p:nvPr>
+            <p:ph type="ftr" sz="quarter" idx="13"/>
+          </p:nvPr>
+        </p:nvSpPr>
+        <p:spPr/>
+        <p:txBody>
+          <a:bodyPr/>
+          <a:lstStyle/>
+          <a:p>
+            <a:pPr marL="231775" defTabSz="914099" eaLnBrk="0" hangingPunct="0"/>
+            <a:r>
+              <a:rPr lang="en-US" sz="500" smtClean="0">
+                <a:gradFill>
+                  <a:gsLst>
+                    <a:gs pos="0">
+                      <a:schemeClr val="tx1"/>
+                    </a:gs>
+                    <a:gs pos="100000">
+                      <a:schemeClr val="tx1"/>
+                    </a:gs>
+                  </a:gsLst>
+                  <a:lin ang="5400000" scaled="0"/>
+                </a:gradFill>
+                <a:latin typeface="Segoe UI" pitchFamily="34" charset="0"/>
+                <a:ea typeface="Segoe UI" pitchFamily="34" charset="0"/>
+                <a:cs typeface="Segoe UI" pitchFamily="34" charset="0"/>
+              </a:rPr>
+              <a:t>© 2012 Microsoft Corporation. All rights reserved. Microsoft, Windows, and other product names are or may be registered trademarks and/or trademarks in the U.S. and/or other countries.</a:t>
+            </a:r>
+          </a:p>
+          <a:p>
+            <a:pPr marL="231775" defTabSz="914099" eaLnBrk="0" hangingPunct="0"/>
+            <a:r>
+              <a:rPr lang="en-US" sz="500" smtClean="0">
+                <a:gradFill>
+                  <a:gsLst>
+                    <a:gs pos="0">
+                      <a:schemeClr val="tx1"/>
+                    </a:gs>
+                    <a:gs pos="100000">
+                      <a:schemeClr val="tx1"/>
+                    </a:gs>
+                  </a:gsLst>
+                  <a:lin ang="5400000" scaled="0"/>
+                </a:gradFill>
+                <a:latin typeface="Segoe UI" pitchFamily="34" charset="0"/>
+                <a:ea typeface="Segoe UI" pitchFamily="34" charset="0"/>
+                <a:cs typeface="Segoe UI" pitchFamily="34" charset="0"/>
+              </a:rPr>
+              <a:t>The information herein is for informational purposes only and represents the current view of Microsoft Corporation as of the date of this presentation.  Because Microsoft must respond to changing market conditions, it should not be interpreted to be a commitment on the part of Microsoft, and Microsoft cannot guarantee the accuracy of any information provided after the date of this presentation.  MICROSOFT MAKES NO WARRANTIES, EXPRESS, IMPLIED OR STATUTORY, AS TO THE INFORMATION IN THIS PRESENTATION.</a:t>
+            </a:r>
+            <a:endParaRPr lang="en-US" sz="500" dirty="0">
+              <a:gradFill>
+                <a:gsLst>
+                  <a:gs pos="0">
+                    <a:schemeClr val="tx1"/>
+                  </a:gs>
+                  <a:gs pos="100000">
+                    <a:schemeClr val="tx1"/>
+                  </a:gs>
+                </a:gsLst>
+                <a:lin ang="5400000" scaled="0"/>
+              </a:gradFill>
+              <a:latin typeface="Segoe UI" pitchFamily="34" charset="0"/>
+              <a:ea typeface="Segoe UI" pitchFamily="34" charset="0"/>
+              <a:cs typeface="Segoe UI" pitchFamily="34" charset="0"/>
+            </a:endParaRPr>
+          </a:p>
+        </p:txBody>
+      </p:sp>
+    </p:spTree>
+    <p:extLst>
+      <p:ext uri="{BB962C8B-B14F-4D97-AF65-F5344CB8AC3E}">
+        <p14:creationId xmlns:p14="http://schemas.microsoft.com/office/powerpoint/2010/main" val="1097414061"/>
+      </p:ext>
+    </p:extLst>
+  </p:cSld>
+  <p:clrMapOvr>
+    <a:masterClrMapping/>
+  </p:clrMapOvr>
+</p:notes>
+</file>
+
+<file path=ppt/notesSlides/notesSlide18.xml><?xml version="1.0" encoding="utf-8"?>
+<p:notes xmlns:a="http://schemas.openxmlformats.org/drawingml/2006/main" xmlns:r="http://schemas.openxmlformats.org/officeDocument/2006/relationships" xmlns:p="http://schemas.openxmlformats.org/presentationml/2006/main">
+  <p:cSld>
+    <p:spTree>
+      <p:nvGrpSpPr>
+        <p:cNvPr id="1" name=""/>
+        <p:cNvGrpSpPr/>
+        <p:nvPr/>
+      </p:nvGrpSpPr>
+      <p:grpSpPr>
+        <a:xfrm>
+          <a:off x="0" y="0"/>
+          <a:ext cx="0" cy="0"/>
+          <a:chOff x="0" y="0"/>
+          <a:chExt cx="0" cy="0"/>
+        </a:xfrm>
+      </p:grpSpPr>
+      <p:sp>
+        <p:nvSpPr>
+          <p:cNvPr id="2" name="Slide Image Placeholder 1"/>
+          <p:cNvSpPr>
+            <a:spLocks noGrp="1" noRot="1" noChangeAspect="1"/>
+          </p:cNvSpPr>
+          <p:nvPr>
+            <p:ph type="sldImg"/>
+          </p:nvPr>
+        </p:nvSpPr>
+        <p:spPr/>
+      </p:sp>
+      <p:sp>
+        <p:nvSpPr>
+          <p:cNvPr id="3" name="Notes Placeholder 2"/>
+          <p:cNvSpPr>
+            <a:spLocks noGrp="1"/>
+          </p:cNvSpPr>
+          <p:nvPr>
+            <p:ph type="body" idx="1"/>
+          </p:nvPr>
+        </p:nvSpPr>
+        <p:spPr/>
+        <p:txBody>
+          <a:bodyPr/>
+          <a:lstStyle/>
+          <a:p>
+            <a:r>
+              <a:rPr lang="en-US" dirty="0" smtClean="0"/>
+              <a:t>This example is capturing a web page at URL specified</a:t>
+            </a:r>
+            <a:r>
+              <a:rPr lang="en-US" baseline="0" dirty="0" smtClean="0"/>
+              <a:t> in the data-render-</a:t>
+            </a:r>
+            <a:r>
+              <a:rPr lang="en-US" baseline="0" dirty="0" err="1" smtClean="0"/>
+              <a:t>src</a:t>
+            </a:r>
+            <a:r>
+              <a:rPr lang="en-US" baseline="0" dirty="0" smtClean="0"/>
+              <a:t> attribute</a:t>
+            </a:r>
+            <a:r>
+              <a:rPr lang="en-US" dirty="0" smtClean="0"/>
+              <a:t>.</a:t>
+            </a:r>
+            <a:endParaRPr lang="en-US" dirty="0"/>
+          </a:p>
+        </p:txBody>
+      </p:sp>
+      <p:sp>
+        <p:nvSpPr>
+          <p:cNvPr id="4" name="Date Placeholder 3"/>
+          <p:cNvSpPr>
+            <a:spLocks noGrp="1"/>
+          </p:cNvSpPr>
+          <p:nvPr>
+            <p:ph type="dt" idx="10"/>
+          </p:nvPr>
+        </p:nvSpPr>
+        <p:spPr/>
+        <p:txBody>
+          <a:bodyPr/>
+          <a:lstStyle/>
+          <a:p>
+            <a:fld id="{03C3A010-1704-49FC-8235-F1F418F61595}" type="datetime1">
+              <a:rPr lang="en-US" smtClean="0"/>
+              <a:t>10/4/2014</a:t>
+            </a:fld>
+            <a:endParaRPr lang="en-US"/>
+          </a:p>
+        </p:txBody>
+      </p:sp>
+      <p:sp>
+        <p:nvSpPr>
+          <p:cNvPr id="5" name="Slide Number Placeholder 4"/>
+          <p:cNvSpPr>
+            <a:spLocks noGrp="1"/>
+          </p:cNvSpPr>
+          <p:nvPr>
+            <p:ph type="sldNum" sz="quarter" idx="11"/>
+          </p:nvPr>
+        </p:nvSpPr>
+        <p:spPr/>
+        <p:txBody>
+          <a:bodyPr/>
+          <a:lstStyle/>
+          <a:p>
+            <a:fld id="{B4008EB6-D09E-4580-8CD6-DDB14511944F}" type="slidenum">
+              <a:rPr lang="en-US" smtClean="0"/>
+              <a:t>25</a:t>
+            </a:fld>
+            <a:endParaRPr lang="en-US" dirty="0"/>
+          </a:p>
+        </p:txBody>
+      </p:sp>
+      <p:sp>
+        <p:nvSpPr>
+          <p:cNvPr id="6" name="Header Placeholder 5"/>
+          <p:cNvSpPr>
+            <a:spLocks noGrp="1"/>
+          </p:cNvSpPr>
+          <p:nvPr>
+            <p:ph type="hdr" sz="quarter" idx="12"/>
+          </p:nvPr>
+        </p:nvSpPr>
+        <p:spPr/>
+        <p:txBody>
+          <a:bodyPr/>
+          <a:lstStyle/>
+          <a:p>
+            <a:r>
+              <a:rPr lang="en-US" smtClean="0"/>
+              <a:t>Microsoft Office</a:t>
+            </a:r>
+            <a:endParaRPr lang="en-US" dirty="0"/>
+          </a:p>
+        </p:txBody>
+      </p:sp>
+      <p:sp>
+        <p:nvSpPr>
+          <p:cNvPr id="7" name="Footer Placeholder 6"/>
+          <p:cNvSpPr>
+            <a:spLocks noGrp="1"/>
+          </p:cNvSpPr>
+          <p:nvPr>
+            <p:ph type="ftr" sz="quarter" idx="13"/>
+          </p:nvPr>
+        </p:nvSpPr>
+        <p:spPr/>
+        <p:txBody>
+          <a:bodyPr/>
+          <a:lstStyle/>
+          <a:p>
+            <a:pPr marL="231775" defTabSz="914099" eaLnBrk="0" hangingPunct="0"/>
+            <a:r>
+              <a:rPr lang="en-US" sz="500" smtClean="0">
+                <a:gradFill>
+                  <a:gsLst>
+                    <a:gs pos="0">
+                      <a:schemeClr val="tx1"/>
+                    </a:gs>
+                    <a:gs pos="100000">
+                      <a:schemeClr val="tx1"/>
+                    </a:gs>
+                  </a:gsLst>
+                  <a:lin ang="5400000" scaled="0"/>
+                </a:gradFill>
+                <a:latin typeface="Segoe UI" pitchFamily="34" charset="0"/>
+                <a:ea typeface="Segoe UI" pitchFamily="34" charset="0"/>
+                <a:cs typeface="Segoe UI" pitchFamily="34" charset="0"/>
+              </a:rPr>
+              <a:t>© 2012 Microsoft Corporation. All rights reserved. Microsoft, Windows, and other product names are or may be registered trademarks and/or trademarks in the U.S. and/or other countries.</a:t>
+            </a:r>
+          </a:p>
+          <a:p>
+            <a:pPr marL="231775" defTabSz="914099" eaLnBrk="0" hangingPunct="0"/>
+            <a:r>
+              <a:rPr lang="en-US" sz="500" smtClean="0">
+                <a:gradFill>
+                  <a:gsLst>
+                    <a:gs pos="0">
+                      <a:schemeClr val="tx1"/>
+                    </a:gs>
+                    <a:gs pos="100000">
+                      <a:schemeClr val="tx1"/>
+                    </a:gs>
+                  </a:gsLst>
+                  <a:lin ang="5400000" scaled="0"/>
+                </a:gradFill>
+                <a:latin typeface="Segoe UI" pitchFamily="34" charset="0"/>
+                <a:ea typeface="Segoe UI" pitchFamily="34" charset="0"/>
+                <a:cs typeface="Segoe UI" pitchFamily="34" charset="0"/>
+              </a:rPr>
+              <a:t>The information herein is for informational purposes only and represents the current view of Microsoft Corporation as of the date of this presentation.  Because Microsoft must respond to changing market conditions, it should not be interpreted to be a commitment on the part of Microsoft, and Microsoft cannot guarantee the accuracy of any information provided after the date of this presentation.  MICROSOFT MAKES NO WARRANTIES, EXPRESS, IMPLIED OR STATUTORY, AS TO THE INFORMATION IN THIS PRESENTATION.</a:t>
+            </a:r>
+            <a:endParaRPr lang="en-US" sz="500" dirty="0">
+              <a:gradFill>
+                <a:gsLst>
+                  <a:gs pos="0">
+                    <a:schemeClr val="tx1"/>
+                  </a:gs>
+                  <a:gs pos="100000">
+                    <a:schemeClr val="tx1"/>
+                  </a:gs>
+                </a:gsLst>
+                <a:lin ang="5400000" scaled="0"/>
+              </a:gradFill>
+              <a:latin typeface="Segoe UI" pitchFamily="34" charset="0"/>
+              <a:ea typeface="Segoe UI" pitchFamily="34" charset="0"/>
+              <a:cs typeface="Segoe UI" pitchFamily="34" charset="0"/>
+            </a:endParaRPr>
+          </a:p>
+        </p:txBody>
+      </p:sp>
+    </p:spTree>
+    <p:extLst>
+      <p:ext uri="{BB962C8B-B14F-4D97-AF65-F5344CB8AC3E}">
+        <p14:creationId xmlns:p14="http://schemas.microsoft.com/office/powerpoint/2010/main" val="905963875"/>
+      </p:ext>
+    </p:extLst>
+  </p:cSld>
+  <p:clrMapOvr>
+    <a:masterClrMapping/>
+  </p:clrMapOvr>
+</p:notes>
+</file>
+
+<file path=ppt/notesSlides/notesSlide19.xml><?xml version="1.0" encoding="utf-8"?>
+<p:notes xmlns:a="http://schemas.openxmlformats.org/drawingml/2006/main" xmlns:r="http://schemas.openxmlformats.org/officeDocument/2006/relationships" xmlns:p="http://schemas.openxmlformats.org/presentationml/2006/main">
+  <p:cSld>
+    <p:spTree>
+      <p:nvGrpSpPr>
+        <p:cNvPr id="1" name=""/>
+        <p:cNvGrpSpPr/>
+        <p:nvPr/>
+      </p:nvGrpSpPr>
+      <p:grpSpPr>
+        <a:xfrm>
+          <a:off x="0" y="0"/>
+          <a:ext cx="0" cy="0"/>
+          <a:chOff x="0" y="0"/>
+          <a:chExt cx="0" cy="0"/>
+        </a:xfrm>
+      </p:grpSpPr>
+      <p:sp>
+        <p:nvSpPr>
+          <p:cNvPr id="2" name="Slide Image Placeholder 1"/>
+          <p:cNvSpPr>
+            <a:spLocks noGrp="1" noRot="1" noChangeAspect="1"/>
+          </p:cNvSpPr>
+          <p:nvPr>
+            <p:ph type="sldImg"/>
+          </p:nvPr>
+        </p:nvSpPr>
+        <p:spPr/>
+      </p:sp>
+      <p:sp>
+        <p:nvSpPr>
+          <p:cNvPr id="3" name="Notes Placeholder 2"/>
+          <p:cNvSpPr>
+            <a:spLocks noGrp="1"/>
+          </p:cNvSpPr>
+          <p:nvPr>
+            <p:ph type="body" idx="1"/>
+          </p:nvPr>
+        </p:nvSpPr>
+        <p:spPr/>
+        <p:txBody>
+          <a:bodyPr/>
+          <a:lstStyle/>
+          <a:p>
+            <a:r>
+              <a:rPr lang="en-US" dirty="0" smtClean="0"/>
+              <a:t>The first method is great for archiving things you see on web sites that change frequently.</a:t>
+            </a:r>
+          </a:p>
+          <a:p>
+            <a:endParaRPr lang="en-US" dirty="0" smtClean="0"/>
+          </a:p>
+          <a:p>
+            <a:r>
+              <a:rPr lang="en-US" dirty="0" smtClean="0"/>
+              <a:t>The second method is useful when the web page is more-complex than the OneNote page can faithfully render, or when the page requires login credentials. It is important to know that the HTML in the non-presentation block cannot use the data-render-src attribute.</a:t>
+            </a:r>
+          </a:p>
+          <a:p>
+            <a:endParaRPr lang="en-US" dirty="0" smtClean="0"/>
+          </a:p>
+        </p:txBody>
+      </p:sp>
+      <p:sp>
+        <p:nvSpPr>
+          <p:cNvPr id="4" name="Date Placeholder 3"/>
+          <p:cNvSpPr>
+            <a:spLocks noGrp="1"/>
+          </p:cNvSpPr>
+          <p:nvPr>
+            <p:ph type="dt" idx="10"/>
+          </p:nvPr>
+        </p:nvSpPr>
+        <p:spPr/>
+        <p:txBody>
+          <a:bodyPr/>
+          <a:lstStyle/>
+          <a:p>
+            <a:fld id="{83076554-B7F1-4ECF-B249-05F619EE0826}" type="datetime1">
+              <a:rPr lang="en-US" smtClean="0"/>
+              <a:t>10/4/2014</a:t>
+            </a:fld>
+            <a:endParaRPr lang="en-US"/>
+          </a:p>
+        </p:txBody>
+      </p:sp>
+      <p:sp>
+        <p:nvSpPr>
+          <p:cNvPr id="5" name="Slide Number Placeholder 4"/>
+          <p:cNvSpPr>
+            <a:spLocks noGrp="1"/>
+          </p:cNvSpPr>
+          <p:nvPr>
+            <p:ph type="sldNum" sz="quarter" idx="11"/>
+          </p:nvPr>
+        </p:nvSpPr>
+        <p:spPr/>
+        <p:txBody>
+          <a:bodyPr/>
+          <a:lstStyle/>
+          <a:p>
+            <a:fld id="{B4008EB6-D09E-4580-8CD6-DDB14511944F}" type="slidenum">
+              <a:rPr lang="en-US" smtClean="0"/>
+              <a:t>26</a:t>
+            </a:fld>
+            <a:endParaRPr lang="en-US" dirty="0"/>
+          </a:p>
+        </p:txBody>
+      </p:sp>
+      <p:sp>
+        <p:nvSpPr>
+          <p:cNvPr id="6" name="Header Placeholder 5"/>
+          <p:cNvSpPr>
+            <a:spLocks noGrp="1"/>
+          </p:cNvSpPr>
+          <p:nvPr>
+            <p:ph type="hdr" sz="quarter" idx="12"/>
+          </p:nvPr>
+        </p:nvSpPr>
+        <p:spPr/>
+        <p:txBody>
+          <a:bodyPr/>
+          <a:lstStyle/>
+          <a:p>
+            <a:r>
+              <a:rPr lang="en-US" smtClean="0"/>
+              <a:t>Microsoft Office</a:t>
+            </a:r>
+            <a:endParaRPr lang="en-US" dirty="0"/>
+          </a:p>
+        </p:txBody>
+      </p:sp>
+      <p:sp>
+        <p:nvSpPr>
+          <p:cNvPr id="7" name="Footer Placeholder 6"/>
+          <p:cNvSpPr>
+            <a:spLocks noGrp="1"/>
+          </p:cNvSpPr>
+          <p:nvPr>
+            <p:ph type="ftr" sz="quarter" idx="13"/>
+          </p:nvPr>
+        </p:nvSpPr>
+        <p:spPr/>
+        <p:txBody>
+          <a:bodyPr/>
+          <a:lstStyle/>
+          <a:p>
+            <a:pPr marL="231775" defTabSz="914099" eaLnBrk="0" hangingPunct="0"/>
+            <a:r>
+              <a:rPr lang="en-US" sz="500" smtClean="0">
+                <a:gradFill>
+                  <a:gsLst>
+                    <a:gs pos="0">
+                      <a:schemeClr val="tx1"/>
+                    </a:gs>
+                    <a:gs pos="100000">
+                      <a:schemeClr val="tx1"/>
+                    </a:gs>
+                  </a:gsLst>
+                  <a:lin ang="5400000" scaled="0"/>
+                </a:gradFill>
+                <a:latin typeface="Segoe UI" pitchFamily="34" charset="0"/>
+                <a:ea typeface="Segoe UI" pitchFamily="34" charset="0"/>
+                <a:cs typeface="Segoe UI" pitchFamily="34" charset="0"/>
+              </a:rPr>
+              <a:t>© 2012 Microsoft Corporation. All rights reserved. Microsoft, Windows, and other product names are or may be registered trademarks and/or trademarks in the U.S. and/or other countries.</a:t>
+            </a:r>
+          </a:p>
+          <a:p>
+            <a:pPr marL="231775" defTabSz="914099" eaLnBrk="0" hangingPunct="0"/>
+            <a:r>
+              <a:rPr lang="en-US" sz="500" smtClean="0">
+                <a:gradFill>
+                  <a:gsLst>
+                    <a:gs pos="0">
+                      <a:schemeClr val="tx1"/>
+                    </a:gs>
+                    <a:gs pos="100000">
+                      <a:schemeClr val="tx1"/>
+                    </a:gs>
+                  </a:gsLst>
+                  <a:lin ang="5400000" scaled="0"/>
+                </a:gradFill>
+                <a:latin typeface="Segoe UI" pitchFamily="34" charset="0"/>
+                <a:ea typeface="Segoe UI" pitchFamily="34" charset="0"/>
+                <a:cs typeface="Segoe UI" pitchFamily="34" charset="0"/>
+              </a:rPr>
+              <a:t>The information herein is for informational purposes only and represents the current view of Microsoft Corporation as of the date of this presentation.  Because Microsoft must respond to changing market conditions, it should not be interpreted to be a commitment on the part of Microsoft, and Microsoft cannot guarantee the accuracy of any information provided after the date of this presentation.  MICROSOFT MAKES NO WARRANTIES, EXPRESS, IMPLIED OR STATUTORY, AS TO THE INFORMATION IN THIS PRESENTATION.</a:t>
+            </a:r>
+            <a:endParaRPr lang="en-US" sz="500" dirty="0">
+              <a:gradFill>
+                <a:gsLst>
+                  <a:gs pos="0">
+                    <a:schemeClr val="tx1"/>
+                  </a:gs>
+                  <a:gs pos="100000">
+                    <a:schemeClr val="tx1"/>
+                  </a:gs>
+                </a:gsLst>
+                <a:lin ang="5400000" scaled="0"/>
+              </a:gradFill>
+              <a:latin typeface="Segoe UI" pitchFamily="34" charset="0"/>
+              <a:ea typeface="Segoe UI" pitchFamily="34" charset="0"/>
+              <a:cs typeface="Segoe UI" pitchFamily="34" charset="0"/>
+            </a:endParaRPr>
+          </a:p>
+        </p:txBody>
+      </p:sp>
+    </p:spTree>
+    <p:extLst>
+      <p:ext uri="{BB962C8B-B14F-4D97-AF65-F5344CB8AC3E}">
+        <p14:creationId xmlns:p14="http://schemas.microsoft.com/office/powerpoint/2010/main" val="1887950778"/>
       </p:ext>
     </p:extLst>
   </p:cSld>
@@ -2445,7 +3858,7 @@
           <a:p>
             <a:fld id="{B079C3B8-7366-4A44-A34B-3977080C19E7}" type="datetime1">
               <a:rPr lang="en-US" smtClean="0"/>
-              <a:t>9/18/2014</a:t>
+              <a:t>10/4/2014</a:t>
             </a:fld>
             <a:endParaRPr lang="en-US" dirty="0"/>
           </a:p>
@@ -2502,6 +3915,1350 @@
     <p:extLst>
       <p:ext uri="{BB962C8B-B14F-4D97-AF65-F5344CB8AC3E}">
         <p14:creationId xmlns:p14="http://schemas.microsoft.com/office/powerpoint/2010/main" val="1709623921"/>
+      </p:ext>
+    </p:extLst>
+  </p:cSld>
+  <p:clrMapOvr>
+    <a:masterClrMapping/>
+  </p:clrMapOvr>
+</p:notes>
+</file>
+
+<file path=ppt/notesSlides/notesSlide20.xml><?xml version="1.0" encoding="utf-8"?>
+<p:notes xmlns:a="http://schemas.openxmlformats.org/drawingml/2006/main" xmlns:r="http://schemas.openxmlformats.org/officeDocument/2006/relationships" xmlns:p="http://schemas.openxmlformats.org/presentationml/2006/main">
+  <p:cSld>
+    <p:spTree>
+      <p:nvGrpSpPr>
+        <p:cNvPr id="1" name=""/>
+        <p:cNvGrpSpPr/>
+        <p:nvPr/>
+      </p:nvGrpSpPr>
+      <p:grpSpPr>
+        <a:xfrm>
+          <a:off x="0" y="0"/>
+          <a:ext cx="0" cy="0"/>
+          <a:chOff x="0" y="0"/>
+          <a:chExt cx="0" cy="0"/>
+        </a:xfrm>
+      </p:grpSpPr>
+      <p:sp>
+        <p:nvSpPr>
+          <p:cNvPr id="2" name="Slide Image Placeholder 1"/>
+          <p:cNvSpPr>
+            <a:spLocks noGrp="1" noRot="1" noChangeAspect="1"/>
+          </p:cNvSpPr>
+          <p:nvPr>
+            <p:ph type="sldImg"/>
+          </p:nvPr>
+        </p:nvSpPr>
+        <p:spPr/>
+      </p:sp>
+      <p:sp>
+        <p:nvSpPr>
+          <p:cNvPr id="3" name="Notes Placeholder 2"/>
+          <p:cNvSpPr>
+            <a:spLocks noGrp="1"/>
+          </p:cNvSpPr>
+          <p:nvPr>
+            <p:ph type="body" idx="1"/>
+          </p:nvPr>
+        </p:nvSpPr>
+        <p:spPr/>
+        <p:txBody>
+          <a:bodyPr/>
+          <a:lstStyle/>
+          <a:p>
+            <a:r>
+              <a:rPr lang="en-US" dirty="0" smtClean="0"/>
+              <a:t>Some pointers</a:t>
+            </a:r>
+            <a:r>
+              <a:rPr lang="en-US" baseline="0" dirty="0" smtClean="0"/>
+              <a:t> for determine which approach to use when capturing a page.</a:t>
+            </a:r>
+          </a:p>
+          <a:p>
+            <a:endParaRPr lang="en-US" baseline="0" dirty="0" smtClean="0"/>
+          </a:p>
+          <a:p>
+            <a:r>
+              <a:rPr lang="en-US" baseline="0" dirty="0" smtClean="0"/>
+              <a:t>If the page has complex HTML, then perhaps just let OneNote capture instead of trying to parse the HTML yourself</a:t>
+            </a:r>
+          </a:p>
+          <a:p>
+            <a:endParaRPr lang="en-US" baseline="0" dirty="0" smtClean="0"/>
+          </a:p>
+          <a:p>
+            <a:r>
+              <a:rPr lang="en-US" baseline="0" dirty="0" smtClean="0"/>
+              <a:t>If you *must* have editable text, then you will need to send html instead of a URL</a:t>
+            </a:r>
+            <a:endParaRPr lang="en-US" dirty="0"/>
+          </a:p>
+        </p:txBody>
+      </p:sp>
+      <p:sp>
+        <p:nvSpPr>
+          <p:cNvPr id="4" name="Date Placeholder 3"/>
+          <p:cNvSpPr>
+            <a:spLocks noGrp="1"/>
+          </p:cNvSpPr>
+          <p:nvPr>
+            <p:ph type="dt" idx="10"/>
+          </p:nvPr>
+        </p:nvSpPr>
+        <p:spPr/>
+        <p:txBody>
+          <a:bodyPr/>
+          <a:lstStyle/>
+          <a:p>
+            <a:fld id="{07F7AC47-5374-444A-9582-0A8C8163A3B5}" type="datetime1">
+              <a:rPr lang="en-US" smtClean="0"/>
+              <a:t>10/4/2014</a:t>
+            </a:fld>
+            <a:endParaRPr lang="en-US"/>
+          </a:p>
+        </p:txBody>
+      </p:sp>
+      <p:sp>
+        <p:nvSpPr>
+          <p:cNvPr id="5" name="Slide Number Placeholder 4"/>
+          <p:cNvSpPr>
+            <a:spLocks noGrp="1"/>
+          </p:cNvSpPr>
+          <p:nvPr>
+            <p:ph type="sldNum" sz="quarter" idx="11"/>
+          </p:nvPr>
+        </p:nvSpPr>
+        <p:spPr/>
+        <p:txBody>
+          <a:bodyPr/>
+          <a:lstStyle/>
+          <a:p>
+            <a:fld id="{B4008EB6-D09E-4580-8CD6-DDB14511944F}" type="slidenum">
+              <a:rPr lang="en-US" smtClean="0"/>
+              <a:t>27</a:t>
+            </a:fld>
+            <a:endParaRPr lang="en-US" dirty="0"/>
+          </a:p>
+        </p:txBody>
+      </p:sp>
+      <p:sp>
+        <p:nvSpPr>
+          <p:cNvPr id="6" name="Header Placeholder 5"/>
+          <p:cNvSpPr>
+            <a:spLocks noGrp="1"/>
+          </p:cNvSpPr>
+          <p:nvPr>
+            <p:ph type="hdr" sz="quarter" idx="12"/>
+          </p:nvPr>
+        </p:nvSpPr>
+        <p:spPr/>
+        <p:txBody>
+          <a:bodyPr/>
+          <a:lstStyle/>
+          <a:p>
+            <a:r>
+              <a:rPr lang="en-US" smtClean="0"/>
+              <a:t>Microsoft Office</a:t>
+            </a:r>
+            <a:endParaRPr lang="en-US" dirty="0"/>
+          </a:p>
+        </p:txBody>
+      </p:sp>
+      <p:sp>
+        <p:nvSpPr>
+          <p:cNvPr id="7" name="Footer Placeholder 6"/>
+          <p:cNvSpPr>
+            <a:spLocks noGrp="1"/>
+          </p:cNvSpPr>
+          <p:nvPr>
+            <p:ph type="ftr" sz="quarter" idx="13"/>
+          </p:nvPr>
+        </p:nvSpPr>
+        <p:spPr/>
+        <p:txBody>
+          <a:bodyPr/>
+          <a:lstStyle/>
+          <a:p>
+            <a:pPr marL="231775" defTabSz="914099" eaLnBrk="0" hangingPunct="0"/>
+            <a:r>
+              <a:rPr lang="en-US" sz="500" smtClean="0">
+                <a:gradFill>
+                  <a:gsLst>
+                    <a:gs pos="0">
+                      <a:schemeClr val="tx1"/>
+                    </a:gs>
+                    <a:gs pos="100000">
+                      <a:schemeClr val="tx1"/>
+                    </a:gs>
+                  </a:gsLst>
+                  <a:lin ang="5400000" scaled="0"/>
+                </a:gradFill>
+                <a:latin typeface="Segoe UI" pitchFamily="34" charset="0"/>
+                <a:ea typeface="Segoe UI" pitchFamily="34" charset="0"/>
+                <a:cs typeface="Segoe UI" pitchFamily="34" charset="0"/>
+              </a:rPr>
+              <a:t>© 2012 Microsoft Corporation. All rights reserved. Microsoft, Windows, and other product names are or may be registered trademarks and/or trademarks in the U.S. and/or other countries.</a:t>
+            </a:r>
+          </a:p>
+          <a:p>
+            <a:pPr marL="231775" defTabSz="914099" eaLnBrk="0" hangingPunct="0"/>
+            <a:r>
+              <a:rPr lang="en-US" sz="500" smtClean="0">
+                <a:gradFill>
+                  <a:gsLst>
+                    <a:gs pos="0">
+                      <a:schemeClr val="tx1"/>
+                    </a:gs>
+                    <a:gs pos="100000">
+                      <a:schemeClr val="tx1"/>
+                    </a:gs>
+                  </a:gsLst>
+                  <a:lin ang="5400000" scaled="0"/>
+                </a:gradFill>
+                <a:latin typeface="Segoe UI" pitchFamily="34" charset="0"/>
+                <a:ea typeface="Segoe UI" pitchFamily="34" charset="0"/>
+                <a:cs typeface="Segoe UI" pitchFamily="34" charset="0"/>
+              </a:rPr>
+              <a:t>The information herein is for informational purposes only and represents the current view of Microsoft Corporation as of the date of this presentation.  Because Microsoft must respond to changing market conditions, it should not be interpreted to be a commitment on the part of Microsoft, and Microsoft cannot guarantee the accuracy of any information provided after the date of this presentation.  MICROSOFT MAKES NO WARRANTIES, EXPRESS, IMPLIED OR STATUTORY, AS TO THE INFORMATION IN THIS PRESENTATION.</a:t>
+            </a:r>
+            <a:endParaRPr lang="en-US" sz="500" dirty="0">
+              <a:gradFill>
+                <a:gsLst>
+                  <a:gs pos="0">
+                    <a:schemeClr val="tx1"/>
+                  </a:gs>
+                  <a:gs pos="100000">
+                    <a:schemeClr val="tx1"/>
+                  </a:gs>
+                </a:gsLst>
+                <a:lin ang="5400000" scaled="0"/>
+              </a:gradFill>
+              <a:latin typeface="Segoe UI" pitchFamily="34" charset="0"/>
+              <a:ea typeface="Segoe UI" pitchFamily="34" charset="0"/>
+              <a:cs typeface="Segoe UI" pitchFamily="34" charset="0"/>
+            </a:endParaRPr>
+          </a:p>
+        </p:txBody>
+      </p:sp>
+    </p:spTree>
+    <p:extLst>
+      <p:ext uri="{BB962C8B-B14F-4D97-AF65-F5344CB8AC3E}">
+        <p14:creationId xmlns:p14="http://schemas.microsoft.com/office/powerpoint/2010/main" val="151335234"/>
+      </p:ext>
+    </p:extLst>
+  </p:cSld>
+  <p:clrMapOvr>
+    <a:masterClrMapping/>
+  </p:clrMapOvr>
+</p:notes>
+</file>
+
+<file path=ppt/notesSlides/notesSlide21.xml><?xml version="1.0" encoding="utf-8"?>
+<p:notes xmlns:a="http://schemas.openxmlformats.org/drawingml/2006/main" xmlns:r="http://schemas.openxmlformats.org/officeDocument/2006/relationships" xmlns:p="http://schemas.openxmlformats.org/presentationml/2006/main">
+  <p:cSld>
+    <p:spTree>
+      <p:nvGrpSpPr>
+        <p:cNvPr id="1" name=""/>
+        <p:cNvGrpSpPr/>
+        <p:nvPr/>
+      </p:nvGrpSpPr>
+      <p:grpSpPr>
+        <a:xfrm>
+          <a:off x="0" y="0"/>
+          <a:ext cx="0" cy="0"/>
+          <a:chOff x="0" y="0"/>
+          <a:chExt cx="0" cy="0"/>
+        </a:xfrm>
+      </p:grpSpPr>
+      <p:sp>
+        <p:nvSpPr>
+          <p:cNvPr id="2" name="Slide Image Placeholder 1"/>
+          <p:cNvSpPr>
+            <a:spLocks noGrp="1" noRot="1" noChangeAspect="1"/>
+          </p:cNvSpPr>
+          <p:nvPr>
+            <p:ph type="sldImg"/>
+          </p:nvPr>
+        </p:nvSpPr>
+        <p:spPr/>
+      </p:sp>
+      <p:sp>
+        <p:nvSpPr>
+          <p:cNvPr id="3" name="Notes Placeholder 2"/>
+          <p:cNvSpPr>
+            <a:spLocks noGrp="1"/>
+          </p:cNvSpPr>
+          <p:nvPr>
+            <p:ph type="body" idx="1"/>
+          </p:nvPr>
+        </p:nvSpPr>
+        <p:spPr/>
+        <p:txBody>
+          <a:bodyPr/>
+          <a:lstStyle/>
+          <a:p>
+            <a:r>
+              <a:rPr lang="en-US" dirty="0" smtClean="0"/>
+              <a:t>The &lt;object&gt; tag in the “Presentation” html will embed the file and show an icon.</a:t>
+            </a:r>
+          </a:p>
+          <a:p>
+            <a:endParaRPr lang="en-US" dirty="0" smtClean="0"/>
+          </a:p>
+          <a:p>
+            <a:r>
+              <a:rPr lang="en-US" dirty="0" smtClean="0"/>
+              <a:t>The available media types:</a:t>
+            </a:r>
+            <a:r>
+              <a:rPr lang="en-US" baseline="0" dirty="0" smtClean="0"/>
+              <a:t> http://blogs.msdn.com/b/vsofficedeveloper/archive/2008/05/08/office-2007-open-xml-mime-types.aspx</a:t>
+            </a:r>
+          </a:p>
+          <a:p>
+            <a:endParaRPr lang="en-US" baseline="0" dirty="0" smtClean="0"/>
+          </a:p>
+          <a:p>
+            <a:pPr marL="0" marR="0" indent="0" algn="l" defTabSz="914363" rtl="0" eaLnBrk="1" fontAlgn="auto" latinLnBrk="0" hangingPunct="1">
+              <a:lnSpc>
+                <a:spcPct val="90000"/>
+              </a:lnSpc>
+              <a:spcBef>
+                <a:spcPts val="0"/>
+              </a:spcBef>
+              <a:spcAft>
+                <a:spcPts val="333"/>
+              </a:spcAft>
+              <a:buClrTx/>
+              <a:buSzTx/>
+              <a:buFontTx/>
+              <a:buNone/>
+              <a:tabLst/>
+              <a:defRPr/>
+            </a:pPr>
+            <a:r>
+              <a:rPr lang="en-US" dirty="0" err="1" smtClean="0"/>
+              <a:t>docx</a:t>
+            </a:r>
+            <a:r>
+              <a:rPr lang="en-US" dirty="0" smtClean="0"/>
+              <a:t> == </a:t>
+            </a:r>
+            <a:r>
+              <a:rPr lang="en-US" sz="900" kern="1200" dirty="0" smtClean="0">
+                <a:solidFill>
+                  <a:schemeClr val="tx1"/>
+                </a:solidFill>
+                <a:effectLst/>
+                <a:latin typeface="Segoe UI Light" pitchFamily="34" charset="0"/>
+                <a:ea typeface="+mn-ea"/>
+                <a:cs typeface="+mn-cs"/>
+              </a:rPr>
+              <a:t>application/</a:t>
+            </a:r>
+            <a:r>
+              <a:rPr lang="en-US" sz="900" kern="1200" dirty="0" err="1" smtClean="0">
+                <a:solidFill>
+                  <a:schemeClr val="tx1"/>
+                </a:solidFill>
+                <a:effectLst/>
+                <a:latin typeface="Segoe UI Light" pitchFamily="34" charset="0"/>
+                <a:ea typeface="+mn-ea"/>
+                <a:cs typeface="+mn-cs"/>
+              </a:rPr>
+              <a:t>vnd.openxmlformats-officedocument.wordprocessingml.document</a:t>
+            </a:r>
+            <a:endParaRPr lang="en-US" dirty="0" smtClean="0">
+              <a:effectLst/>
+            </a:endParaRPr>
+          </a:p>
+          <a:p>
+            <a:pPr marL="0" marR="0" indent="0" algn="l" defTabSz="914363" rtl="0" eaLnBrk="1" fontAlgn="auto" latinLnBrk="0" hangingPunct="1">
+              <a:lnSpc>
+                <a:spcPct val="90000"/>
+              </a:lnSpc>
+              <a:spcBef>
+                <a:spcPts val="0"/>
+              </a:spcBef>
+              <a:spcAft>
+                <a:spcPts val="333"/>
+              </a:spcAft>
+              <a:buClrTx/>
+              <a:buSzTx/>
+              <a:buFontTx/>
+              <a:buNone/>
+              <a:tabLst/>
+              <a:defRPr/>
+            </a:pPr>
+            <a:r>
+              <a:rPr lang="en-US" dirty="0" err="1" smtClean="0"/>
+              <a:t>xlsx</a:t>
+            </a:r>
+            <a:r>
+              <a:rPr lang="en-US" dirty="0" smtClean="0"/>
+              <a:t> == </a:t>
+            </a:r>
+            <a:r>
+              <a:rPr lang="en-US" sz="900" kern="1200" dirty="0" smtClean="0">
+                <a:solidFill>
+                  <a:schemeClr val="tx1"/>
+                </a:solidFill>
+                <a:effectLst/>
+                <a:latin typeface="Segoe UI Light" pitchFamily="34" charset="0"/>
+                <a:ea typeface="+mn-ea"/>
+                <a:cs typeface="+mn-cs"/>
+              </a:rPr>
+              <a:t>application/</a:t>
+            </a:r>
+            <a:r>
+              <a:rPr lang="en-US" sz="900" kern="1200" dirty="0" err="1" smtClean="0">
+                <a:solidFill>
+                  <a:schemeClr val="tx1"/>
+                </a:solidFill>
+                <a:effectLst/>
+                <a:latin typeface="Segoe UI Light" pitchFamily="34" charset="0"/>
+                <a:ea typeface="+mn-ea"/>
+                <a:cs typeface="+mn-cs"/>
+              </a:rPr>
+              <a:t>vnd.openxmlformats-officedocument.spreadsheetml.sheet</a:t>
+            </a:r>
+            <a:endParaRPr lang="en-US" dirty="0" smtClean="0">
+              <a:effectLst/>
+            </a:endParaRPr>
+          </a:p>
+          <a:p>
+            <a:pPr marL="0" marR="0" indent="0" algn="l" defTabSz="914363" rtl="0" eaLnBrk="1" fontAlgn="auto" latinLnBrk="0" hangingPunct="1">
+              <a:lnSpc>
+                <a:spcPct val="90000"/>
+              </a:lnSpc>
+              <a:spcBef>
+                <a:spcPts val="0"/>
+              </a:spcBef>
+              <a:spcAft>
+                <a:spcPts val="333"/>
+              </a:spcAft>
+              <a:buClrTx/>
+              <a:buSzTx/>
+              <a:buFontTx/>
+              <a:buNone/>
+              <a:tabLst/>
+              <a:defRPr/>
+            </a:pPr>
+            <a:r>
+              <a:rPr lang="en-US" dirty="0" err="1" smtClean="0"/>
+              <a:t>pptx</a:t>
+            </a:r>
+            <a:r>
+              <a:rPr lang="en-US" dirty="0" smtClean="0"/>
+              <a:t> == </a:t>
+            </a:r>
+            <a:r>
+              <a:rPr lang="en-US" sz="900" kern="1200" dirty="0" smtClean="0">
+                <a:solidFill>
+                  <a:schemeClr val="tx1"/>
+                </a:solidFill>
+                <a:effectLst/>
+                <a:latin typeface="Segoe UI Light" pitchFamily="34" charset="0"/>
+                <a:ea typeface="+mn-ea"/>
+                <a:cs typeface="+mn-cs"/>
+              </a:rPr>
+              <a:t>application/</a:t>
+            </a:r>
+            <a:r>
+              <a:rPr lang="en-US" sz="900" kern="1200" dirty="0" err="1" smtClean="0">
+                <a:solidFill>
+                  <a:schemeClr val="tx1"/>
+                </a:solidFill>
+                <a:effectLst/>
+                <a:latin typeface="Segoe UI Light" pitchFamily="34" charset="0"/>
+                <a:ea typeface="+mn-ea"/>
+                <a:cs typeface="+mn-cs"/>
+              </a:rPr>
+              <a:t>vnd.openxmlformats-officedocument.presentationml.presentation</a:t>
+            </a:r>
+            <a:endParaRPr lang="en-US" dirty="0" smtClean="0">
+              <a:effectLst/>
+            </a:endParaRPr>
+          </a:p>
+          <a:p>
+            <a:endParaRPr lang="en-US" dirty="0"/>
+          </a:p>
+        </p:txBody>
+      </p:sp>
+      <p:sp>
+        <p:nvSpPr>
+          <p:cNvPr id="4" name="Date Placeholder 3"/>
+          <p:cNvSpPr>
+            <a:spLocks noGrp="1"/>
+          </p:cNvSpPr>
+          <p:nvPr>
+            <p:ph type="dt" idx="10"/>
+          </p:nvPr>
+        </p:nvSpPr>
+        <p:spPr/>
+        <p:txBody>
+          <a:bodyPr/>
+          <a:lstStyle/>
+          <a:p>
+            <a:fld id="{C52E1354-054B-4436-8C69-DD1EE4477A9C}" type="datetime1">
+              <a:rPr lang="en-US" smtClean="0"/>
+              <a:t>10/4/2014</a:t>
+            </a:fld>
+            <a:endParaRPr lang="en-US"/>
+          </a:p>
+        </p:txBody>
+      </p:sp>
+      <p:sp>
+        <p:nvSpPr>
+          <p:cNvPr id="5" name="Slide Number Placeholder 4"/>
+          <p:cNvSpPr>
+            <a:spLocks noGrp="1"/>
+          </p:cNvSpPr>
+          <p:nvPr>
+            <p:ph type="sldNum" sz="quarter" idx="11"/>
+          </p:nvPr>
+        </p:nvSpPr>
+        <p:spPr/>
+        <p:txBody>
+          <a:bodyPr/>
+          <a:lstStyle/>
+          <a:p>
+            <a:fld id="{B4008EB6-D09E-4580-8CD6-DDB14511944F}" type="slidenum">
+              <a:rPr lang="en-US" smtClean="0"/>
+              <a:t>28</a:t>
+            </a:fld>
+            <a:endParaRPr lang="en-US" dirty="0"/>
+          </a:p>
+        </p:txBody>
+      </p:sp>
+      <p:sp>
+        <p:nvSpPr>
+          <p:cNvPr id="6" name="Header Placeholder 5"/>
+          <p:cNvSpPr>
+            <a:spLocks noGrp="1"/>
+          </p:cNvSpPr>
+          <p:nvPr>
+            <p:ph type="hdr" sz="quarter" idx="12"/>
+          </p:nvPr>
+        </p:nvSpPr>
+        <p:spPr/>
+        <p:txBody>
+          <a:bodyPr/>
+          <a:lstStyle/>
+          <a:p>
+            <a:r>
+              <a:rPr lang="en-US" smtClean="0"/>
+              <a:t>Microsoft Office</a:t>
+            </a:r>
+            <a:endParaRPr lang="en-US" dirty="0"/>
+          </a:p>
+        </p:txBody>
+      </p:sp>
+      <p:sp>
+        <p:nvSpPr>
+          <p:cNvPr id="7" name="Footer Placeholder 6"/>
+          <p:cNvSpPr>
+            <a:spLocks noGrp="1"/>
+          </p:cNvSpPr>
+          <p:nvPr>
+            <p:ph type="ftr" sz="quarter" idx="13"/>
+          </p:nvPr>
+        </p:nvSpPr>
+        <p:spPr/>
+        <p:txBody>
+          <a:bodyPr/>
+          <a:lstStyle/>
+          <a:p>
+            <a:pPr marL="231775" defTabSz="914099" eaLnBrk="0" hangingPunct="0"/>
+            <a:r>
+              <a:rPr lang="en-US" sz="500" smtClean="0">
+                <a:gradFill>
+                  <a:gsLst>
+                    <a:gs pos="0">
+                      <a:schemeClr val="tx1"/>
+                    </a:gs>
+                    <a:gs pos="100000">
+                      <a:schemeClr val="tx1"/>
+                    </a:gs>
+                  </a:gsLst>
+                  <a:lin ang="5400000" scaled="0"/>
+                </a:gradFill>
+                <a:latin typeface="Segoe UI" pitchFamily="34" charset="0"/>
+                <a:ea typeface="Segoe UI" pitchFamily="34" charset="0"/>
+                <a:cs typeface="Segoe UI" pitchFamily="34" charset="0"/>
+              </a:rPr>
+              <a:t>© 2012 Microsoft Corporation. All rights reserved. Microsoft, Windows, and other product names are or may be registered trademarks and/or trademarks in the U.S. and/or other countries.</a:t>
+            </a:r>
+          </a:p>
+          <a:p>
+            <a:pPr marL="231775" defTabSz="914099" eaLnBrk="0" hangingPunct="0"/>
+            <a:r>
+              <a:rPr lang="en-US" sz="500" smtClean="0">
+                <a:gradFill>
+                  <a:gsLst>
+                    <a:gs pos="0">
+                      <a:schemeClr val="tx1"/>
+                    </a:gs>
+                    <a:gs pos="100000">
+                      <a:schemeClr val="tx1"/>
+                    </a:gs>
+                  </a:gsLst>
+                  <a:lin ang="5400000" scaled="0"/>
+                </a:gradFill>
+                <a:latin typeface="Segoe UI" pitchFamily="34" charset="0"/>
+                <a:ea typeface="Segoe UI" pitchFamily="34" charset="0"/>
+                <a:cs typeface="Segoe UI" pitchFamily="34" charset="0"/>
+              </a:rPr>
+              <a:t>The information herein is for informational purposes only and represents the current view of Microsoft Corporation as of the date of this presentation.  Because Microsoft must respond to changing market conditions, it should not be interpreted to be a commitment on the part of Microsoft, and Microsoft cannot guarantee the accuracy of any information provided after the date of this presentation.  MICROSOFT MAKES NO WARRANTIES, EXPRESS, IMPLIED OR STATUTORY, AS TO THE INFORMATION IN THIS PRESENTATION.</a:t>
+            </a:r>
+            <a:endParaRPr lang="en-US" sz="500" dirty="0">
+              <a:gradFill>
+                <a:gsLst>
+                  <a:gs pos="0">
+                    <a:schemeClr val="tx1"/>
+                  </a:gs>
+                  <a:gs pos="100000">
+                    <a:schemeClr val="tx1"/>
+                  </a:gs>
+                </a:gsLst>
+                <a:lin ang="5400000" scaled="0"/>
+              </a:gradFill>
+              <a:latin typeface="Segoe UI" pitchFamily="34" charset="0"/>
+              <a:ea typeface="Segoe UI" pitchFamily="34" charset="0"/>
+              <a:cs typeface="Segoe UI" pitchFamily="34" charset="0"/>
+            </a:endParaRPr>
+          </a:p>
+        </p:txBody>
+      </p:sp>
+    </p:spTree>
+    <p:extLst>
+      <p:ext uri="{BB962C8B-B14F-4D97-AF65-F5344CB8AC3E}">
+        <p14:creationId xmlns:p14="http://schemas.microsoft.com/office/powerpoint/2010/main" val="1578194203"/>
+      </p:ext>
+    </p:extLst>
+  </p:cSld>
+  <p:clrMapOvr>
+    <a:masterClrMapping/>
+  </p:clrMapOvr>
+</p:notes>
+</file>
+
+<file path=ppt/notesSlides/notesSlide22.xml><?xml version="1.0" encoding="utf-8"?>
+<p:notes xmlns:a="http://schemas.openxmlformats.org/drawingml/2006/main" xmlns:r="http://schemas.openxmlformats.org/officeDocument/2006/relationships" xmlns:p="http://schemas.openxmlformats.org/presentationml/2006/main">
+  <p:cSld>
+    <p:spTree>
+      <p:nvGrpSpPr>
+        <p:cNvPr id="1" name=""/>
+        <p:cNvGrpSpPr/>
+        <p:nvPr/>
+      </p:nvGrpSpPr>
+      <p:grpSpPr>
+        <a:xfrm>
+          <a:off x="0" y="0"/>
+          <a:ext cx="0" cy="0"/>
+          <a:chOff x="0" y="0"/>
+          <a:chExt cx="0" cy="0"/>
+        </a:xfrm>
+      </p:grpSpPr>
+      <p:sp>
+        <p:nvSpPr>
+          <p:cNvPr id="2" name="Slide Image Placeholder 1"/>
+          <p:cNvSpPr>
+            <a:spLocks noGrp="1" noRot="1" noChangeAspect="1"/>
+          </p:cNvSpPr>
+          <p:nvPr>
+            <p:ph type="sldImg"/>
+          </p:nvPr>
+        </p:nvSpPr>
+        <p:spPr/>
+      </p:sp>
+      <p:sp>
+        <p:nvSpPr>
+          <p:cNvPr id="3" name="Notes Placeholder 2"/>
+          <p:cNvSpPr>
+            <a:spLocks noGrp="1"/>
+          </p:cNvSpPr>
+          <p:nvPr>
+            <p:ph type="body" idx="1"/>
+          </p:nvPr>
+        </p:nvSpPr>
+        <p:spPr/>
+        <p:txBody>
+          <a:bodyPr/>
+          <a:lstStyle/>
+          <a:p>
+            <a:r>
+              <a:rPr lang="en-US" dirty="0" smtClean="0"/>
+              <a:t>As</a:t>
+            </a:r>
+            <a:r>
+              <a:rPr lang="en-US" baseline="0" dirty="0" smtClean="0"/>
+              <a:t> mentioned, the &lt;object&gt; tag will embed the pdf.</a:t>
+            </a:r>
+          </a:p>
+          <a:p>
+            <a:endParaRPr lang="en-US" baseline="0" dirty="0" smtClean="0"/>
+          </a:p>
+          <a:p>
+            <a:r>
+              <a:rPr lang="en-US" baseline="0" dirty="0" smtClean="0"/>
+              <a:t>An &lt;</a:t>
+            </a:r>
+            <a:r>
+              <a:rPr lang="en-US" baseline="0" dirty="0" err="1" smtClean="0"/>
+              <a:t>img</a:t>
+            </a:r>
+            <a:r>
+              <a:rPr lang="en-US" baseline="0" dirty="0" smtClean="0"/>
+              <a:t>&gt; tag, when pointed to a </a:t>
+            </a:r>
+            <a:r>
+              <a:rPr lang="en-US" baseline="0" dirty="0" err="1" smtClean="0"/>
+              <a:t>StreamContent</a:t>
+            </a:r>
+            <a:r>
+              <a:rPr lang="en-US" baseline="0" dirty="0" smtClean="0"/>
+              <a:t> that represents a pdf will create an image for each page.</a:t>
+            </a:r>
+            <a:endParaRPr lang="en-US" dirty="0"/>
+          </a:p>
+        </p:txBody>
+      </p:sp>
+      <p:sp>
+        <p:nvSpPr>
+          <p:cNvPr id="4" name="Date Placeholder 3"/>
+          <p:cNvSpPr>
+            <a:spLocks noGrp="1"/>
+          </p:cNvSpPr>
+          <p:nvPr>
+            <p:ph type="dt" idx="10"/>
+          </p:nvPr>
+        </p:nvSpPr>
+        <p:spPr/>
+        <p:txBody>
+          <a:bodyPr/>
+          <a:lstStyle/>
+          <a:p>
+            <a:fld id="{C27B0470-8B2F-4431-8CEC-555856810907}" type="datetime1">
+              <a:rPr lang="en-US" smtClean="0"/>
+              <a:t>10/4/2014</a:t>
+            </a:fld>
+            <a:endParaRPr lang="en-US"/>
+          </a:p>
+        </p:txBody>
+      </p:sp>
+      <p:sp>
+        <p:nvSpPr>
+          <p:cNvPr id="5" name="Slide Number Placeholder 4"/>
+          <p:cNvSpPr>
+            <a:spLocks noGrp="1"/>
+          </p:cNvSpPr>
+          <p:nvPr>
+            <p:ph type="sldNum" sz="quarter" idx="11"/>
+          </p:nvPr>
+        </p:nvSpPr>
+        <p:spPr/>
+        <p:txBody>
+          <a:bodyPr/>
+          <a:lstStyle/>
+          <a:p>
+            <a:fld id="{B4008EB6-D09E-4580-8CD6-DDB14511944F}" type="slidenum">
+              <a:rPr lang="en-US" smtClean="0"/>
+              <a:t>29</a:t>
+            </a:fld>
+            <a:endParaRPr lang="en-US" dirty="0"/>
+          </a:p>
+        </p:txBody>
+      </p:sp>
+      <p:sp>
+        <p:nvSpPr>
+          <p:cNvPr id="6" name="Header Placeholder 5"/>
+          <p:cNvSpPr>
+            <a:spLocks noGrp="1"/>
+          </p:cNvSpPr>
+          <p:nvPr>
+            <p:ph type="hdr" sz="quarter" idx="12"/>
+          </p:nvPr>
+        </p:nvSpPr>
+        <p:spPr/>
+        <p:txBody>
+          <a:bodyPr/>
+          <a:lstStyle/>
+          <a:p>
+            <a:r>
+              <a:rPr lang="en-US" smtClean="0"/>
+              <a:t>Microsoft Office</a:t>
+            </a:r>
+            <a:endParaRPr lang="en-US" dirty="0"/>
+          </a:p>
+        </p:txBody>
+      </p:sp>
+      <p:sp>
+        <p:nvSpPr>
+          <p:cNvPr id="7" name="Footer Placeholder 6"/>
+          <p:cNvSpPr>
+            <a:spLocks noGrp="1"/>
+          </p:cNvSpPr>
+          <p:nvPr>
+            <p:ph type="ftr" sz="quarter" idx="13"/>
+          </p:nvPr>
+        </p:nvSpPr>
+        <p:spPr/>
+        <p:txBody>
+          <a:bodyPr/>
+          <a:lstStyle/>
+          <a:p>
+            <a:pPr marL="231775" defTabSz="914099" eaLnBrk="0" hangingPunct="0"/>
+            <a:r>
+              <a:rPr lang="en-US" sz="500" smtClean="0">
+                <a:gradFill>
+                  <a:gsLst>
+                    <a:gs pos="0">
+                      <a:schemeClr val="tx1"/>
+                    </a:gs>
+                    <a:gs pos="100000">
+                      <a:schemeClr val="tx1"/>
+                    </a:gs>
+                  </a:gsLst>
+                  <a:lin ang="5400000" scaled="0"/>
+                </a:gradFill>
+                <a:latin typeface="Segoe UI" pitchFamily="34" charset="0"/>
+                <a:ea typeface="Segoe UI" pitchFamily="34" charset="0"/>
+                <a:cs typeface="Segoe UI" pitchFamily="34" charset="0"/>
+              </a:rPr>
+              <a:t>© 2012 Microsoft Corporation. All rights reserved. Microsoft, Windows, and other product names are or may be registered trademarks and/or trademarks in the U.S. and/or other countries.</a:t>
+            </a:r>
+          </a:p>
+          <a:p>
+            <a:pPr marL="231775" defTabSz="914099" eaLnBrk="0" hangingPunct="0"/>
+            <a:r>
+              <a:rPr lang="en-US" sz="500" smtClean="0">
+                <a:gradFill>
+                  <a:gsLst>
+                    <a:gs pos="0">
+                      <a:schemeClr val="tx1"/>
+                    </a:gs>
+                    <a:gs pos="100000">
+                      <a:schemeClr val="tx1"/>
+                    </a:gs>
+                  </a:gsLst>
+                  <a:lin ang="5400000" scaled="0"/>
+                </a:gradFill>
+                <a:latin typeface="Segoe UI" pitchFamily="34" charset="0"/>
+                <a:ea typeface="Segoe UI" pitchFamily="34" charset="0"/>
+                <a:cs typeface="Segoe UI" pitchFamily="34" charset="0"/>
+              </a:rPr>
+              <a:t>The information herein is for informational purposes only and represents the current view of Microsoft Corporation as of the date of this presentation.  Because Microsoft must respond to changing market conditions, it should not be interpreted to be a commitment on the part of Microsoft, and Microsoft cannot guarantee the accuracy of any information provided after the date of this presentation.  MICROSOFT MAKES NO WARRANTIES, EXPRESS, IMPLIED OR STATUTORY, AS TO THE INFORMATION IN THIS PRESENTATION.</a:t>
+            </a:r>
+            <a:endParaRPr lang="en-US" sz="500" dirty="0">
+              <a:gradFill>
+                <a:gsLst>
+                  <a:gs pos="0">
+                    <a:schemeClr val="tx1"/>
+                  </a:gs>
+                  <a:gs pos="100000">
+                    <a:schemeClr val="tx1"/>
+                  </a:gs>
+                </a:gsLst>
+                <a:lin ang="5400000" scaled="0"/>
+              </a:gradFill>
+              <a:latin typeface="Segoe UI" pitchFamily="34" charset="0"/>
+              <a:ea typeface="Segoe UI" pitchFamily="34" charset="0"/>
+              <a:cs typeface="Segoe UI" pitchFamily="34" charset="0"/>
+            </a:endParaRPr>
+          </a:p>
+        </p:txBody>
+      </p:sp>
+    </p:spTree>
+    <p:extLst>
+      <p:ext uri="{BB962C8B-B14F-4D97-AF65-F5344CB8AC3E}">
+        <p14:creationId xmlns:p14="http://schemas.microsoft.com/office/powerpoint/2010/main" val="1546061638"/>
+      </p:ext>
+    </p:extLst>
+  </p:cSld>
+  <p:clrMapOvr>
+    <a:masterClrMapping/>
+  </p:clrMapOvr>
+</p:notes>
+</file>
+
+<file path=ppt/notesSlides/notesSlide23.xml><?xml version="1.0" encoding="utf-8"?>
+<p:notes xmlns:a="http://schemas.openxmlformats.org/drawingml/2006/main" xmlns:r="http://schemas.openxmlformats.org/officeDocument/2006/relationships" xmlns:p="http://schemas.openxmlformats.org/presentationml/2006/main">
+  <p:cSld>
+    <p:spTree>
+      <p:nvGrpSpPr>
+        <p:cNvPr id="1" name=""/>
+        <p:cNvGrpSpPr/>
+        <p:nvPr/>
+      </p:nvGrpSpPr>
+      <p:grpSpPr>
+        <a:xfrm>
+          <a:off x="0" y="0"/>
+          <a:ext cx="0" cy="0"/>
+          <a:chOff x="0" y="0"/>
+          <a:chExt cx="0" cy="0"/>
+        </a:xfrm>
+      </p:grpSpPr>
+      <p:sp>
+        <p:nvSpPr>
+          <p:cNvPr id="2" name="Slide Image Placeholder 1"/>
+          <p:cNvSpPr>
+            <a:spLocks noGrp="1" noRot="1" noChangeAspect="1"/>
+          </p:cNvSpPr>
+          <p:nvPr>
+            <p:ph type="sldImg"/>
+          </p:nvPr>
+        </p:nvSpPr>
+        <p:spPr/>
+      </p:sp>
+      <p:sp>
+        <p:nvSpPr>
+          <p:cNvPr id="3" name="Notes Placeholder 2"/>
+          <p:cNvSpPr>
+            <a:spLocks noGrp="1"/>
+          </p:cNvSpPr>
+          <p:nvPr>
+            <p:ph type="body" idx="1"/>
+          </p:nvPr>
+        </p:nvSpPr>
+        <p:spPr/>
+        <p:txBody>
+          <a:bodyPr/>
+          <a:lstStyle/>
+          <a:p>
+            <a:r>
+              <a:rPr lang="en-US" dirty="0" smtClean="0"/>
+              <a:t>Demos\</a:t>
+            </a:r>
+            <a:r>
+              <a:rPr lang="en-US" dirty="0" err="1" smtClean="0"/>
+              <a:t>OneNoteAPISampleWinStore</a:t>
+            </a:r>
+            <a:r>
+              <a:rPr lang="en-US" baseline="0" dirty="0" smtClean="0"/>
+              <a:t> folder:</a:t>
+            </a:r>
+          </a:p>
+          <a:p>
+            <a:endParaRPr lang="en-US" baseline="0" dirty="0" smtClean="0"/>
+          </a:p>
+          <a:p>
+            <a:r>
+              <a:rPr lang="en-US" baseline="0" dirty="0" smtClean="0"/>
+              <a:t>Check authentication status in upper right. Click Authenticate if necessary. In the </a:t>
+            </a:r>
+            <a:r>
+              <a:rPr lang="en-US" baseline="0" dirty="0" err="1" smtClean="0"/>
+              <a:t>flyout</a:t>
+            </a:r>
+            <a:r>
+              <a:rPr lang="en-US" baseline="0" dirty="0" smtClean="0"/>
+              <a:t>, click Account</a:t>
+            </a:r>
+          </a:p>
+          <a:p>
+            <a:r>
+              <a:rPr lang="en-US" baseline="0" dirty="0" smtClean="0"/>
+              <a:t>In left navigation, select a scenario.</a:t>
+            </a:r>
+          </a:p>
+          <a:p>
+            <a:r>
+              <a:rPr lang="en-US" baseline="0" dirty="0" smtClean="0"/>
+              <a:t>In center, enter a section name. If it does not exist, it will be created.</a:t>
+            </a:r>
+          </a:p>
+          <a:p>
+            <a:r>
+              <a:rPr lang="en-US" baseline="0" dirty="0" smtClean="0"/>
+              <a:t>Click the Create Page button to create the page. Review Response and link boxes.</a:t>
+            </a:r>
+          </a:p>
+          <a:p>
+            <a:r>
+              <a:rPr lang="en-US" baseline="0" dirty="0" smtClean="0"/>
+              <a:t>** Do not click “Step through create page code” button at this time. **</a:t>
+            </a:r>
+          </a:p>
+          <a:p>
+            <a:r>
+              <a:rPr lang="en-US" baseline="0" dirty="0" smtClean="0"/>
+              <a:t>After running a few scenarios, return to the slides to explain the steps.</a:t>
+            </a:r>
+            <a:endParaRPr lang="en-US" dirty="0"/>
+          </a:p>
+        </p:txBody>
+      </p:sp>
+      <p:sp>
+        <p:nvSpPr>
+          <p:cNvPr id="4" name="Date Placeholder 3"/>
+          <p:cNvSpPr>
+            <a:spLocks noGrp="1"/>
+          </p:cNvSpPr>
+          <p:nvPr>
+            <p:ph type="dt" idx="10"/>
+          </p:nvPr>
+        </p:nvSpPr>
+        <p:spPr/>
+        <p:txBody>
+          <a:bodyPr/>
+          <a:lstStyle/>
+          <a:p>
+            <a:fld id="{6B8BF90D-BD61-43D7-93E0-6CBEC8B2313A}" type="datetime1">
+              <a:rPr lang="en-US" smtClean="0"/>
+              <a:t>10/4/2014</a:t>
+            </a:fld>
+            <a:endParaRPr lang="en-US"/>
+          </a:p>
+        </p:txBody>
+      </p:sp>
+      <p:sp>
+        <p:nvSpPr>
+          <p:cNvPr id="5" name="Slide Number Placeholder 4"/>
+          <p:cNvSpPr>
+            <a:spLocks noGrp="1"/>
+          </p:cNvSpPr>
+          <p:nvPr>
+            <p:ph type="sldNum" sz="quarter" idx="11"/>
+          </p:nvPr>
+        </p:nvSpPr>
+        <p:spPr/>
+        <p:txBody>
+          <a:bodyPr/>
+          <a:lstStyle/>
+          <a:p>
+            <a:fld id="{B4008EB6-D09E-4580-8CD6-DDB14511944F}" type="slidenum">
+              <a:rPr lang="en-US" smtClean="0"/>
+              <a:t>30</a:t>
+            </a:fld>
+            <a:endParaRPr lang="en-US" dirty="0"/>
+          </a:p>
+        </p:txBody>
+      </p:sp>
+      <p:sp>
+        <p:nvSpPr>
+          <p:cNvPr id="6" name="Header Placeholder 5"/>
+          <p:cNvSpPr>
+            <a:spLocks noGrp="1"/>
+          </p:cNvSpPr>
+          <p:nvPr>
+            <p:ph type="hdr" sz="quarter" idx="12"/>
+          </p:nvPr>
+        </p:nvSpPr>
+        <p:spPr/>
+        <p:txBody>
+          <a:bodyPr/>
+          <a:lstStyle/>
+          <a:p>
+            <a:r>
+              <a:rPr lang="en-US" smtClean="0"/>
+              <a:t>Microsoft Office</a:t>
+            </a:r>
+            <a:endParaRPr lang="en-US" dirty="0"/>
+          </a:p>
+        </p:txBody>
+      </p:sp>
+      <p:sp>
+        <p:nvSpPr>
+          <p:cNvPr id="7" name="Footer Placeholder 6"/>
+          <p:cNvSpPr>
+            <a:spLocks noGrp="1"/>
+          </p:cNvSpPr>
+          <p:nvPr>
+            <p:ph type="ftr" sz="quarter" idx="13"/>
+          </p:nvPr>
+        </p:nvSpPr>
+        <p:spPr/>
+        <p:txBody>
+          <a:bodyPr/>
+          <a:lstStyle/>
+          <a:p>
+            <a:pPr marL="231775" defTabSz="914099" eaLnBrk="0" hangingPunct="0"/>
+            <a:r>
+              <a:rPr lang="en-US" sz="500" smtClean="0">
+                <a:gradFill>
+                  <a:gsLst>
+                    <a:gs pos="0">
+                      <a:schemeClr val="tx1"/>
+                    </a:gs>
+                    <a:gs pos="100000">
+                      <a:schemeClr val="tx1"/>
+                    </a:gs>
+                  </a:gsLst>
+                  <a:lin ang="5400000" scaled="0"/>
+                </a:gradFill>
+                <a:latin typeface="Segoe UI" pitchFamily="34" charset="0"/>
+                <a:ea typeface="Segoe UI" pitchFamily="34" charset="0"/>
+                <a:cs typeface="Segoe UI" pitchFamily="34" charset="0"/>
+              </a:rPr>
+              <a:t>© 2012 Microsoft Corporation. All rights reserved. Microsoft, Windows, and other product names are or may be registered trademarks and/or trademarks in the U.S. and/or other countries.</a:t>
+            </a:r>
+          </a:p>
+          <a:p>
+            <a:pPr marL="231775" defTabSz="914099" eaLnBrk="0" hangingPunct="0"/>
+            <a:r>
+              <a:rPr lang="en-US" sz="500" smtClean="0">
+                <a:gradFill>
+                  <a:gsLst>
+                    <a:gs pos="0">
+                      <a:schemeClr val="tx1"/>
+                    </a:gs>
+                    <a:gs pos="100000">
+                      <a:schemeClr val="tx1"/>
+                    </a:gs>
+                  </a:gsLst>
+                  <a:lin ang="5400000" scaled="0"/>
+                </a:gradFill>
+                <a:latin typeface="Segoe UI" pitchFamily="34" charset="0"/>
+                <a:ea typeface="Segoe UI" pitchFamily="34" charset="0"/>
+                <a:cs typeface="Segoe UI" pitchFamily="34" charset="0"/>
+              </a:rPr>
+              <a:t>The information herein is for informational purposes only and represents the current view of Microsoft Corporation as of the date of this presentation.  Because Microsoft must respond to changing market conditions, it should not be interpreted to be a commitment on the part of Microsoft, and Microsoft cannot guarantee the accuracy of any information provided after the date of this presentation.  MICROSOFT MAKES NO WARRANTIES, EXPRESS, IMPLIED OR STATUTORY, AS TO THE INFORMATION IN THIS PRESENTATION.</a:t>
+            </a:r>
+            <a:endParaRPr lang="en-US" sz="500" dirty="0">
+              <a:gradFill>
+                <a:gsLst>
+                  <a:gs pos="0">
+                    <a:schemeClr val="tx1"/>
+                  </a:gs>
+                  <a:gs pos="100000">
+                    <a:schemeClr val="tx1"/>
+                  </a:gs>
+                </a:gsLst>
+                <a:lin ang="5400000" scaled="0"/>
+              </a:gradFill>
+              <a:latin typeface="Segoe UI" pitchFamily="34" charset="0"/>
+              <a:ea typeface="Segoe UI" pitchFamily="34" charset="0"/>
+              <a:cs typeface="Segoe UI" pitchFamily="34" charset="0"/>
+            </a:endParaRPr>
+          </a:p>
+        </p:txBody>
+      </p:sp>
+    </p:spTree>
+    <p:extLst>
+      <p:ext uri="{BB962C8B-B14F-4D97-AF65-F5344CB8AC3E}">
+        <p14:creationId xmlns:p14="http://schemas.microsoft.com/office/powerpoint/2010/main" val="1282694547"/>
+      </p:ext>
+    </p:extLst>
+  </p:cSld>
+  <p:clrMapOvr>
+    <a:masterClrMapping/>
+  </p:clrMapOvr>
+</p:notes>
+</file>
+
+<file path=ppt/notesSlides/notesSlide24.xml><?xml version="1.0" encoding="utf-8"?>
+<p:notes xmlns:a="http://schemas.openxmlformats.org/drawingml/2006/main" xmlns:r="http://schemas.openxmlformats.org/officeDocument/2006/relationships" xmlns:p="http://schemas.openxmlformats.org/presentationml/2006/main">
+  <p:cSld>
+    <p:spTree>
+      <p:nvGrpSpPr>
+        <p:cNvPr id="1" name=""/>
+        <p:cNvGrpSpPr/>
+        <p:nvPr/>
+      </p:nvGrpSpPr>
+      <p:grpSpPr>
+        <a:xfrm>
+          <a:off x="0" y="0"/>
+          <a:ext cx="0" cy="0"/>
+          <a:chOff x="0" y="0"/>
+          <a:chExt cx="0" cy="0"/>
+        </a:xfrm>
+      </p:grpSpPr>
+      <p:sp>
+        <p:nvSpPr>
+          <p:cNvPr id="2" name="Slide Image Placeholder 1"/>
+          <p:cNvSpPr>
+            <a:spLocks noGrp="1" noRot="1" noChangeAspect="1"/>
+          </p:cNvSpPr>
+          <p:nvPr>
+            <p:ph type="sldImg"/>
+          </p:nvPr>
+        </p:nvSpPr>
+        <p:spPr/>
+      </p:sp>
+      <p:sp>
+        <p:nvSpPr>
+          <p:cNvPr id="3" name="Notes Placeholder 2"/>
+          <p:cNvSpPr>
+            <a:spLocks noGrp="1"/>
+          </p:cNvSpPr>
+          <p:nvPr>
+            <p:ph type="body" idx="1"/>
+          </p:nvPr>
+        </p:nvSpPr>
+        <p:spPr/>
+        <p:txBody>
+          <a:bodyPr/>
+          <a:lstStyle/>
+          <a:p>
+            <a:endParaRPr lang="en-US"/>
+          </a:p>
+        </p:txBody>
+      </p:sp>
+      <p:sp>
+        <p:nvSpPr>
+          <p:cNvPr id="4" name="Header Placeholder 3"/>
+          <p:cNvSpPr>
+            <a:spLocks noGrp="1"/>
+          </p:cNvSpPr>
+          <p:nvPr>
+            <p:ph type="hdr" sz="quarter" idx="10"/>
+          </p:nvPr>
+        </p:nvSpPr>
+        <p:spPr>
+          <a:xfrm>
+            <a:off x="0" y="0"/>
+            <a:ext cx="2971800" cy="457200"/>
+          </a:xfrm>
+          <a:prstGeom prst="rect">
+            <a:avLst/>
+          </a:prstGeom>
+        </p:spPr>
+        <p:txBody>
+          <a:bodyPr/>
+          <a:lstStyle/>
+          <a:p>
+            <a:endParaRPr lang="en-US" dirty="0"/>
+          </a:p>
+        </p:txBody>
+      </p:sp>
+      <p:sp>
+        <p:nvSpPr>
+          <p:cNvPr id="5" name="Footer Placeholder 4"/>
+          <p:cNvSpPr>
+            <a:spLocks noGrp="1"/>
+          </p:cNvSpPr>
+          <p:nvPr>
+            <p:ph type="ftr" sz="quarter" idx="11"/>
+          </p:nvPr>
+        </p:nvSpPr>
+        <p:spPr>
+          <a:xfrm>
+            <a:off x="0" y="8686800"/>
+            <a:ext cx="5920740" cy="355964"/>
+          </a:xfrm>
+          <a:prstGeom prst="rect">
+            <a:avLst/>
+          </a:prstGeom>
+        </p:spPr>
+        <p:txBody>
+          <a:bodyPr/>
+          <a:lstStyle/>
+          <a:p>
+            <a:pPr defTabSz="914099" eaLnBrk="0" hangingPunct="0"/>
+            <a:r>
+              <a:rPr lang="en-US" sz="400" smtClean="0">
+                <a:gradFill>
+                  <a:gsLst>
+                    <a:gs pos="0">
+                      <a:prstClr val="black"/>
+                    </a:gs>
+                    <a:gs pos="100000">
+                      <a:prstClr val="black"/>
+                    </a:gs>
+                  </a:gsLst>
+                  <a:lin ang="5400000" scaled="0"/>
+                </a:gradFill>
+                <a:latin typeface="Segoe UI" pitchFamily="34" charset="0"/>
+                <a:ea typeface="Segoe UI" pitchFamily="34" charset="0"/>
+                <a:cs typeface="Segoe UI" pitchFamily="34" charset="0"/>
+              </a:rPr>
+              <a:t>© 2012 Microsoft Corporation. All rights reserved. Microsoft, Windows, and other product names are or may be registered trademarks and/or trademarks in the U.S. and/or other countries.</a:t>
+            </a:r>
+          </a:p>
+          <a:p>
+            <a:pPr defTabSz="914099" eaLnBrk="0" hangingPunct="0"/>
+            <a:r>
+              <a:rPr lang="en-US" sz="400" smtClean="0">
+                <a:gradFill>
+                  <a:gsLst>
+                    <a:gs pos="0">
+                      <a:prstClr val="black"/>
+                    </a:gs>
+                    <a:gs pos="100000">
+                      <a:prstClr val="black"/>
+                    </a:gs>
+                  </a:gsLst>
+                  <a:lin ang="5400000" scaled="0"/>
+                </a:gradFill>
+                <a:latin typeface="Segoe UI" pitchFamily="34" charset="0"/>
+                <a:ea typeface="Segoe UI" pitchFamily="34" charset="0"/>
+                <a:cs typeface="Segoe UI" pitchFamily="34" charset="0"/>
+              </a:rPr>
+              <a:t>The information herein is for informational purposes only and represents the current view of Microsoft Corporation as of the date of this presentation.  Because Microsoft must respond to changing market conditions, it should not be interpreted to be a commitment on the part of Microsoft, and Microsoft cannot guarantee the accuracy of any information provided after the date of this presentation.  MICROSOFT MAKES NO WARRANTIES, EXPRESS, IMPLIED OR STATUTORY, AS TO THE INFORMATION IN THIS PRESENTATION.</a:t>
+            </a:r>
+            <a:endParaRPr lang="en-US" sz="400" dirty="0" smtClean="0">
+              <a:gradFill>
+                <a:gsLst>
+                  <a:gs pos="0">
+                    <a:prstClr val="black"/>
+                  </a:gs>
+                  <a:gs pos="100000">
+                    <a:prstClr val="black"/>
+                  </a:gs>
+                </a:gsLst>
+                <a:lin ang="5400000" scaled="0"/>
+              </a:gradFill>
+              <a:latin typeface="Segoe UI" pitchFamily="34" charset="0"/>
+              <a:ea typeface="Segoe UI" pitchFamily="34" charset="0"/>
+              <a:cs typeface="Segoe UI" pitchFamily="34" charset="0"/>
+            </a:endParaRPr>
+          </a:p>
+        </p:txBody>
+      </p:sp>
+      <p:sp>
+        <p:nvSpPr>
+          <p:cNvPr id="6" name="Date Placeholder 5"/>
+          <p:cNvSpPr>
+            <a:spLocks noGrp="1"/>
+          </p:cNvSpPr>
+          <p:nvPr>
+            <p:ph type="dt" idx="12"/>
+          </p:nvPr>
+        </p:nvSpPr>
+        <p:spPr/>
+        <p:txBody>
+          <a:bodyPr/>
+          <a:lstStyle/>
+          <a:p>
+            <a:fld id="{0BB6559B-C68D-49B4-97AE-9BB74C417927}" type="datetime1">
+              <a:rPr lang="en-US" smtClean="0"/>
+              <a:t>10/4/2014</a:t>
+            </a:fld>
+            <a:endParaRPr lang="en-US"/>
+          </a:p>
+        </p:txBody>
+      </p:sp>
+      <p:sp>
+        <p:nvSpPr>
+          <p:cNvPr id="7" name="Slide Number Placeholder 6"/>
+          <p:cNvSpPr>
+            <a:spLocks noGrp="1"/>
+          </p:cNvSpPr>
+          <p:nvPr>
+            <p:ph type="sldNum" sz="quarter" idx="13"/>
+          </p:nvPr>
+        </p:nvSpPr>
+        <p:spPr/>
+        <p:txBody>
+          <a:bodyPr/>
+          <a:lstStyle/>
+          <a:p>
+            <a:fld id="{B4008EB6-D09E-4580-8CD6-DDB14511944F}" type="slidenum">
+              <a:rPr lang="en-US" smtClean="0"/>
+              <a:t>31</a:t>
+            </a:fld>
+            <a:endParaRPr lang="en-US" dirty="0"/>
+          </a:p>
+        </p:txBody>
+      </p:sp>
+    </p:spTree>
+    <p:extLst>
+      <p:ext uri="{BB962C8B-B14F-4D97-AF65-F5344CB8AC3E}">
+        <p14:creationId xmlns:p14="http://schemas.microsoft.com/office/powerpoint/2010/main" val="3695926200"/>
       </p:ext>
     </p:extLst>
   </p:cSld>
@@ -2589,7 +5346,7 @@
                 </a:solidFill>
               </a:rPr>
               <a:pPr/>
-              <a:t>9/18/2014</a:t>
+              <a:t>10/4/2014</a:t>
             </a:fld>
             <a:endParaRPr lang="en-US" dirty="0">
               <a:solidFill>
@@ -2767,7 +5524,7 @@
           <a:p>
             <a:fld id="{74871D00-66CD-407D-8F22-D00C75CBC23A}" type="datetime1">
               <a:rPr lang="en-US" smtClean="0"/>
-              <a:t>9/18/2014</a:t>
+              <a:t>10/4/2014</a:t>
             </a:fld>
             <a:endParaRPr lang="en-US"/>
           </a:p>
@@ -2973,7 +5730,7 @@
           <a:p>
             <a:fld id="{9D411708-D367-4C5A-9983-F6101344A5A8}" type="datetime1">
               <a:rPr lang="en-US" smtClean="0"/>
-              <a:t>9/18/2014</a:t>
+              <a:t>10/4/2014</a:t>
             </a:fld>
             <a:endParaRPr lang="en-US"/>
           </a:p>
@@ -3158,6 +5915,10 @@
           <a:bodyPr/>
           <a:lstStyle/>
           <a:p>
+            <a:r>
+              <a:rPr lang="en-US" dirty="0" smtClean="0"/>
+              <a:t>The second level items are examples of ways to create the captures</a:t>
+            </a:r>
             <a:endParaRPr lang="en-US" dirty="0"/>
           </a:p>
         </p:txBody>
@@ -3179,7 +5940,7 @@
           <a:p>
             <a:fld id="{B39A9A41-7C1A-4478-B25E-FCF894C810B8}" type="datetime1">
               <a:rPr lang="en-US" smtClean="0"/>
-              <a:t>9/18/2014</a:t>
+              <a:t>10/4/2014</a:t>
             </a:fld>
             <a:endParaRPr lang="en-US"/>
           </a:p>
@@ -3364,6 +6125,14 @@
           <a:bodyPr/>
           <a:lstStyle/>
           <a:p>
+            <a:r>
+              <a:rPr lang="en-US" dirty="0" smtClean="0"/>
+              <a:t>The</a:t>
+            </a:r>
+            <a:r>
+              <a:rPr lang="en-US" baseline="0" dirty="0" smtClean="0"/>
+              <a:t> second level items are steps to take to accomplish these captures (this is different than the previous slide)</a:t>
+            </a:r>
             <a:endParaRPr lang="en-US" dirty="0"/>
           </a:p>
         </p:txBody>
@@ -3383,9 +6152,9 @@
           <a:bodyPr/>
           <a:lstStyle/>
           <a:p>
-            <a:fld id="{C45CE394-BDF4-42B3-A02F-AC542AC28186}" type="datetime1">
+            <a:fld id="{C4BE6E85-17BC-4957-9354-2F2AC178507C}" type="datetime1">
               <a:rPr lang="en-US" smtClean="0"/>
-              <a:t>9/18/2014</a:t>
+              <a:t>10/4/2014</a:t>
             </a:fld>
             <a:endParaRPr lang="en-US"/>
           </a:p>
@@ -3408,7 +6177,7 @@
           <a:p>
             <a:fld id="{B4008EB6-D09E-4580-8CD6-DDB14511944F}" type="slidenum">
               <a:rPr lang="en-US" smtClean="0"/>
-              <a:t>11</a:t>
+              <a:t>8</a:t>
             </a:fld>
             <a:endParaRPr lang="en-US" dirty="0"/>
           </a:p>
@@ -3516,7 +6285,7 @@
     </p:spTree>
     <p:extLst>
       <p:ext uri="{BB962C8B-B14F-4D97-AF65-F5344CB8AC3E}">
-        <p14:creationId xmlns:p14="http://schemas.microsoft.com/office/powerpoint/2010/main" val="1360934755"/>
+        <p14:creationId xmlns:p14="http://schemas.microsoft.com/office/powerpoint/2010/main" val="3363995168"/>
       </p:ext>
     </p:extLst>
   </p:cSld>
@@ -3570,27 +6339,6 @@
           <a:bodyPr/>
           <a:lstStyle/>
           <a:p>
-            <a:r>
-              <a:rPr lang="en-US" dirty="0" smtClean="0"/>
-              <a:t>OneNote Clipper: https://www.onenote.com/Clipper/OneNote</a:t>
-            </a:r>
-          </a:p>
-          <a:p>
-            <a:endParaRPr lang="en-US" dirty="0" smtClean="0"/>
-          </a:p>
-          <a:p>
-            <a:r>
-              <a:rPr lang="en-US" dirty="0" smtClean="0"/>
-              <a:t>Demos\</a:t>
-            </a:r>
-            <a:r>
-              <a:rPr lang="en-US" dirty="0" err="1" smtClean="0"/>
-              <a:t>OneNoteSaveDialog</a:t>
-            </a:r>
-            <a:r>
-              <a:rPr lang="en-US" baseline="0" dirty="0" smtClean="0"/>
-              <a:t> folder: The html page contains two links for the Save Dialog. The first will capture a page from MSDN. The second uses jQuery to dynamically set the page to capture to be the current page. Running the page from http://localhost will cause the capture to omit the picture of the page. This is because the OneNote service cannot access localhost. This is an important distinction that will be discussed later in the module.</a:t>
-            </a:r>
             <a:endParaRPr lang="en-US" dirty="0"/>
           </a:p>
         </p:txBody>
@@ -3610,9 +6358,9 @@
           <a:bodyPr/>
           <a:lstStyle/>
           <a:p>
-            <a:fld id="{6B8BF90D-BD61-43D7-93E0-6CBEC8B2313A}" type="datetime1">
+            <a:fld id="{C45CE394-BDF4-42B3-A02F-AC542AC28186}" type="datetime1">
               <a:rPr lang="en-US" smtClean="0"/>
-              <a:t>9/18/2014</a:t>
+              <a:t>10/4/2014</a:t>
             </a:fld>
             <a:endParaRPr lang="en-US"/>
           </a:p>
@@ -3635,7 +6383,7 @@
           <a:p>
             <a:fld id="{B4008EB6-D09E-4580-8CD6-DDB14511944F}" type="slidenum">
               <a:rPr lang="en-US" smtClean="0"/>
-              <a:t>12</a:t>
+              <a:t>11</a:t>
             </a:fld>
             <a:endParaRPr lang="en-US" dirty="0"/>
           </a:p>
@@ -3743,7 +6491,7 @@
     </p:spTree>
     <p:extLst>
       <p:ext uri="{BB962C8B-B14F-4D97-AF65-F5344CB8AC3E}">
-        <p14:creationId xmlns:p14="http://schemas.microsoft.com/office/powerpoint/2010/main" val="2081928627"/>
+        <p14:creationId xmlns:p14="http://schemas.microsoft.com/office/powerpoint/2010/main" val="1360934755"/>
       </p:ext>
     </p:extLst>
   </p:cSld>
@@ -3799,62 +6547,24 @@
           <a:p>
             <a:r>
               <a:rPr lang="en-US" dirty="0" smtClean="0"/>
+              <a:t>OneNote Clipper: https://www.onenote.com/Clipper/OneNote</a:t>
+            </a:r>
+          </a:p>
+          <a:p>
+            <a:endParaRPr lang="en-US" dirty="0" smtClean="0"/>
+          </a:p>
+          <a:p>
+            <a:r>
+              <a:rPr lang="en-US" dirty="0" smtClean="0"/>
               <a:t>Demos\</a:t>
             </a:r>
             <a:r>
               <a:rPr lang="en-US" dirty="0" err="1" smtClean="0"/>
-              <a:t>OneNoteAPISampleWinStore</a:t>
+              <a:t>OneNoteSaveDialog</a:t>
             </a:r>
             <a:r>
               <a:rPr lang="en-US" baseline="0" dirty="0" smtClean="0"/>
-              <a:t> folder:</a:t>
-            </a:r>
-          </a:p>
-          <a:p>
-            <a:endParaRPr lang="en-US" baseline="0" dirty="0" smtClean="0"/>
-          </a:p>
-          <a:p>
-            <a:r>
-              <a:rPr lang="en-US" baseline="0" dirty="0" smtClean="0"/>
-              <a:t>Check authentication status in upper right. Click Authenticate if necessary. In the </a:t>
-            </a:r>
-            <a:r>
-              <a:rPr lang="en-US" baseline="0" dirty="0" err="1" smtClean="0"/>
-              <a:t>flyout</a:t>
-            </a:r>
-            <a:r>
-              <a:rPr lang="en-US" baseline="0" dirty="0" smtClean="0"/>
-              <a:t>, click Account</a:t>
-            </a:r>
-          </a:p>
-          <a:p>
-            <a:r>
-              <a:rPr lang="en-US" baseline="0" dirty="0" smtClean="0"/>
-              <a:t>In left navigation, select a scenario.</a:t>
-            </a:r>
-          </a:p>
-          <a:p>
-            <a:r>
-              <a:rPr lang="en-US" baseline="0" dirty="0" smtClean="0"/>
-              <a:t>In center, enter a section name. If it does not exist, it will be created.</a:t>
-            </a:r>
-          </a:p>
-          <a:p>
-            <a:r>
-              <a:rPr lang="en-US" baseline="0" dirty="0" smtClean="0"/>
-              <a:t>Click the Create Page button to create the page. Review Response and link boxes.</a:t>
-            </a:r>
-          </a:p>
-          <a:p>
-            <a:r>
-              <a:rPr lang="en-US" baseline="0" dirty="0" smtClean="0"/>
-              <a:t>** Do not click “Step through create page code” button at this time. **</a:t>
-            </a:r>
-          </a:p>
-          <a:p>
-            <a:r>
-              <a:rPr lang="en-US" baseline="0" dirty="0" smtClean="0"/>
-              <a:t>After running a few scenarios, return to the slides to explain the steps.</a:t>
+              <a:t> folder: The html page contains two links for the Save Dialog. The first will capture a page from MSDN. The second uses jQuery to dynamically set the page to capture to be the current page. Running the page from http://localhost will cause the capture to omit the picture of the page. This is because the OneNote service cannot access localhost. This is an important distinction that will be discussed later in the module.</a:t>
             </a:r>
             <a:endParaRPr lang="en-US" dirty="0"/>
           </a:p>
@@ -3877,7 +6587,7 @@
           <a:p>
             <a:fld id="{6B8BF90D-BD61-43D7-93E0-6CBEC8B2313A}" type="datetime1">
               <a:rPr lang="en-US" smtClean="0"/>
-              <a:t>9/18/2014</a:t>
+              <a:t>10/4/2014</a:t>
             </a:fld>
             <a:endParaRPr lang="en-US"/>
           </a:p>
@@ -3900,7 +6610,7 @@
           <a:p>
             <a:fld id="{B4008EB6-D09E-4580-8CD6-DDB14511944F}" type="slidenum">
               <a:rPr lang="en-US" smtClean="0"/>
-              <a:t>20</a:t>
+              <a:t>12</a:t>
             </a:fld>
             <a:endParaRPr lang="en-US" dirty="0"/>
           </a:p>
@@ -4008,7 +6718,7 @@
     </p:spTree>
     <p:extLst>
       <p:ext uri="{BB962C8B-B14F-4D97-AF65-F5344CB8AC3E}">
-        <p14:creationId xmlns:p14="http://schemas.microsoft.com/office/powerpoint/2010/main" val="1588160795"/>
+        <p14:creationId xmlns:p14="http://schemas.microsoft.com/office/powerpoint/2010/main" val="2081928627"/>
       </p:ext>
     </p:extLst>
   </p:cSld>
@@ -14537,7 +17247,7 @@
           <p:nvPr/>
         </p:nvPicPr>
         <p:blipFill>
-          <a:blip r:embed="rId2"/>
+          <a:blip r:embed="rId3"/>
           <a:stretch>
             <a:fillRect/>
           </a:stretch>
@@ -14721,7 +17431,7 @@
           <p:nvPr/>
         </p:nvPicPr>
         <p:blipFill>
-          <a:blip r:embed="rId2"/>
+          <a:blip r:embed="rId3"/>
           <a:stretch>
             <a:fillRect/>
           </a:stretch>
@@ -15838,7 +18548,15 @@
           <a:p>
             <a:r>
               <a:rPr lang="en-US" dirty="0" smtClean="0"/>
-              <a:t>Creating Content from Windows Store App</a:t>
+              <a:t>Explore the REST API usin</a:t>
+            </a:r>
+            <a:r>
+              <a:rPr lang="en-US" dirty="0" smtClean="0"/>
+              <a:t>g </a:t>
+            </a:r>
+            <a:r>
+              <a:rPr lang="en-US" dirty="0" err="1" smtClean="0"/>
+              <a:t>apigee</a:t>
             </a:r>
             <a:endParaRPr lang="en-US" dirty="0"/>
           </a:p>
@@ -16152,19 +18870,6 @@
               </a:rPr>
               <a:t>The debugger approach is preferred, but the slides can be used if necessary (network outage, other issues).</a:t>
             </a:r>
-            <a:endParaRPr lang="en-US" sz="2400" spc="-70" dirty="0" smtClean="0">
-              <a:gradFill>
-                <a:gsLst>
-                  <a:gs pos="2917">
-                    <a:schemeClr val="bg2"/>
-                  </a:gs>
-                  <a:gs pos="95000">
-                    <a:schemeClr val="bg2"/>
-                  </a:gs>
-                </a:gsLst>
-                <a:lin ang="5400000" scaled="0"/>
-              </a:gradFill>
-            </a:endParaRPr>
           </a:p>
         </p:txBody>
       </p:sp>
@@ -24832,6 +27537,101 @@
 </file>
 
 <file path=ppt/slides/slide30.xml><?xml version="1.0" encoding="utf-8"?>
+<p:sld xmlns:a="http://schemas.openxmlformats.org/drawingml/2006/main" xmlns:r="http://schemas.openxmlformats.org/officeDocument/2006/relationships" xmlns:p="http://schemas.openxmlformats.org/presentationml/2006/main">
+  <p:cSld>
+    <p:spTree>
+      <p:nvGrpSpPr>
+        <p:cNvPr id="1" name=""/>
+        <p:cNvGrpSpPr/>
+        <p:nvPr/>
+      </p:nvGrpSpPr>
+      <p:grpSpPr>
+        <a:xfrm>
+          <a:off x="0" y="0"/>
+          <a:ext cx="0" cy="0"/>
+          <a:chOff x="0" y="0"/>
+          <a:chExt cx="0" cy="0"/>
+        </a:xfrm>
+      </p:grpSpPr>
+      <p:sp>
+        <p:nvSpPr>
+          <p:cNvPr id="2" name="Title 1"/>
+          <p:cNvSpPr>
+            <a:spLocks noGrp="1"/>
+          </p:cNvSpPr>
+          <p:nvPr>
+            <p:ph type="title"/>
+          </p:nvPr>
+        </p:nvSpPr>
+        <p:spPr/>
+        <p:txBody>
+          <a:bodyPr/>
+          <a:lstStyle/>
+          <a:p>
+            <a:r>
+              <a:rPr lang="en-US" dirty="0" smtClean="0"/>
+              <a:t>demo</a:t>
+            </a:r>
+            <a:endParaRPr lang="en-US" dirty="0"/>
+          </a:p>
+        </p:txBody>
+      </p:sp>
+      <p:sp>
+        <p:nvSpPr>
+          <p:cNvPr id="3" name="Text Placeholder 2"/>
+          <p:cNvSpPr>
+            <a:spLocks noGrp="1"/>
+          </p:cNvSpPr>
+          <p:nvPr>
+            <p:ph type="body" sz="quarter" idx="12"/>
+          </p:nvPr>
+        </p:nvSpPr>
+        <p:spPr/>
+        <p:txBody>
+          <a:bodyPr/>
+          <a:lstStyle/>
+          <a:p>
+            <a:r>
+              <a:rPr lang="en-US" dirty="0" smtClean="0"/>
+              <a:t>Creating Content from Windows Store App</a:t>
+            </a:r>
+            <a:endParaRPr lang="en-US" dirty="0"/>
+          </a:p>
+        </p:txBody>
+      </p:sp>
+    </p:spTree>
+    <p:extLst>
+      <p:ext uri="{BB962C8B-B14F-4D97-AF65-F5344CB8AC3E}">
+        <p14:creationId xmlns:p14="http://schemas.microsoft.com/office/powerpoint/2010/main" val="3794811237"/>
+      </p:ext>
+    </p:extLst>
+  </p:cSld>
+  <p:clrMapOvr>
+    <a:masterClrMapping/>
+  </p:clrMapOvr>
+  <mc:AlternateContent xmlns:mc="http://schemas.openxmlformats.org/markup-compatibility/2006">
+    <mc:Choice xmlns:p14="http://schemas.microsoft.com/office/powerpoint/2010/main" Requires="p14">
+      <p:transition spd="slow" p14:dur="3400">
+        <p14:reveal/>
+      </p:transition>
+    </mc:Choice>
+    <mc:Fallback>
+      <p:transition spd="slow">
+        <p:fade/>
+      </p:transition>
+    </mc:Fallback>
+  </mc:AlternateContent>
+  <p:timing>
+    <p:tnLst>
+      <p:par>
+        <p:cTn id="1" dur="indefinite" restart="never" nodeType="tmRoot"/>
+      </p:par>
+    </p:tnLst>
+  </p:timing>
+</p:sld>
+</file>
+
+<file path=ppt/slides/slide31.xml><?xml version="1.0" encoding="utf-8"?>
 <p:sld xmlns:a="http://schemas.openxmlformats.org/drawingml/2006/main" xmlns:r="http://schemas.openxmlformats.org/officeDocument/2006/relationships" xmlns:p="http://schemas.openxmlformats.org/presentationml/2006/main">
   <p:cSld>
     <p:spTree>
@@ -27546,6 +30346,24 @@
 </file>
 
 <file path=customXml/item1.xml><?xml version="1.0" encoding="utf-8"?>
+<?mso-contentType ?>
+<FormTemplates xmlns="http://schemas.microsoft.com/sharepoint/v3/contenttype/forms">
+  <Display>DocumentLibraryForm</Display>
+  <Edit>DocumentLibraryForm</Edit>
+  <New>DocumentLibraryForm</New>
+</FormTemplates>
+</file>
+
+<file path=customXml/item2.xml><?xml version="1.0" encoding="utf-8"?>
+<p:properties xmlns:p="http://schemas.microsoft.com/office/2006/metadata/properties" xmlns:xsi="http://www.w3.org/2001/XMLSchema-instance" xmlns:pc="http://schemas.microsoft.com/office/infopath/2007/PartnerControls">
+  <documentManagement>
+    <Company xmlns="http://schemas.microsoft.com/sharepoint/v3">Critical Path</Company>
+    <Project xmlns="c7dd7a47-5eb0-4219-9c75-8258c822be9e" xsi:nil="true"/>
+  </documentManagement>
+</p:properties>
+</file>
+
+<file path=customXml/item3.xml><?xml version="1.0" encoding="utf-8"?>
 <ct:contentTypeSchema xmlns:ct="http://schemas.microsoft.com/office/2006/metadata/contentType" xmlns:ma="http://schemas.microsoft.com/office/2006/metadata/properties/metaAttributes" ct:_="" ma:_="" ma:contentTypeName="Document" ma:contentTypeID="0x0101006D61B4CFCB5D8D4A8E65D32A29D8DB3E" ma:contentTypeVersion="3" ma:contentTypeDescription="Create a new document." ma:contentTypeScope="" ma:versionID="f0276697cd14aa124c054602ce8fe3c5">
   <xsd:schema xmlns:xsd="http://www.w3.org/2001/XMLSchema" xmlns:xs="http://www.w3.org/2001/XMLSchema" xmlns:p="http://schemas.microsoft.com/office/2006/metadata/properties" xmlns:ns1="http://schemas.microsoft.com/sharepoint/v3" xmlns:ns2="c7dd7a47-5eb0-4219-9c75-8258c822be9e" targetNamespace="http://schemas.microsoft.com/office/2006/metadata/properties" ma:root="true" ma:fieldsID="ce85d22485e5625b9ccd59583b658dde" ns1:_="" ns2:_="">
     <xsd:import namespace="http://schemas.microsoft.com/sharepoint/v3"/>
@@ -27684,39 +30502,10 @@
 </ct:contentTypeSchema>
 </file>
 
-<file path=customXml/item2.xml><?xml version="1.0" encoding="utf-8"?>
-<p:properties xmlns:p="http://schemas.microsoft.com/office/2006/metadata/properties" xmlns:xsi="http://www.w3.org/2001/XMLSchema-instance" xmlns:pc="http://schemas.microsoft.com/office/infopath/2007/PartnerControls">
-  <documentManagement>
-    <Company xmlns="http://schemas.microsoft.com/sharepoint/v3">Critical Path</Company>
-    <Project xmlns="c7dd7a47-5eb0-4219-9c75-8258c822be9e" xsi:nil="true"/>
-  </documentManagement>
-</p:properties>
-</file>
-
-<file path=customXml/item3.xml><?xml version="1.0" encoding="utf-8"?>
-<?mso-contentType ?>
-<FormTemplates xmlns="http://schemas.microsoft.com/sharepoint/v3/contenttype/forms">
-  <Display>DocumentLibraryForm</Display>
-  <Edit>DocumentLibraryForm</Edit>
-  <New>DocumentLibraryForm</New>
-</FormTemplates>
-</file>
-
 <file path=customXml/itemProps1.xml><?xml version="1.0" encoding="utf-8"?>
-<ds:datastoreItem xmlns:ds="http://schemas.openxmlformats.org/officeDocument/2006/customXml" ds:itemID="{68E324C1-CE8D-4EC4-8ED1-D3EE4E50ABA1}">
+<ds:datastoreItem xmlns:ds="http://schemas.openxmlformats.org/officeDocument/2006/customXml" ds:itemID="{E1E0CE18-CA03-4891-9CD8-3448778E3D53}">
   <ds:schemaRefs>
-    <ds:schemaRef ds:uri="http://schemas.microsoft.com/office/2006/metadata/contentType"/>
-    <ds:schemaRef ds:uri="http://schemas.microsoft.com/office/2006/metadata/properties/metaAttributes"/>
-    <ds:schemaRef ds:uri="http://www.w3.org/2001/XMLSchema"/>
-    <ds:schemaRef ds:uri="http://schemas.microsoft.com/office/2006/metadata/properties"/>
-    <ds:schemaRef ds:uri="http://schemas.microsoft.com/sharepoint/v3"/>
-    <ds:schemaRef ds:uri="c7dd7a47-5eb0-4219-9c75-8258c822be9e"/>
-    <ds:schemaRef ds:uri="http://schemas.microsoft.com/office/2006/documentManagement/types"/>
-    <ds:schemaRef ds:uri="http://schemas.microsoft.com/office/infopath/2007/PartnerControls"/>
-    <ds:schemaRef ds:uri="http://schemas.openxmlformats.org/package/2006/metadata/core-properties"/>
-    <ds:schemaRef ds:uri="http://purl.org/dc/elements/1.1/"/>
-    <ds:schemaRef ds:uri="http://purl.org/dc/terms/"/>
-    <ds:schemaRef ds:uri="http://schemas.microsoft.com/internal/obd"/>
+    <ds:schemaRef ds:uri="http://schemas.microsoft.com/sharepoint/v3/contenttype/forms"/>
   </ds:schemaRefs>
 </ds:datastoreItem>
 </file>
@@ -27739,9 +30528,20 @@
 </file>
 
 <file path=customXml/itemProps3.xml><?xml version="1.0" encoding="utf-8"?>
-<ds:datastoreItem xmlns:ds="http://schemas.openxmlformats.org/officeDocument/2006/customXml" ds:itemID="{E1E0CE18-CA03-4891-9CD8-3448778E3D53}">
+<ds:datastoreItem xmlns:ds="http://schemas.openxmlformats.org/officeDocument/2006/customXml" ds:itemID="{68E324C1-CE8D-4EC4-8ED1-D3EE4E50ABA1}">
   <ds:schemaRefs>
-    <ds:schemaRef ds:uri="http://schemas.microsoft.com/sharepoint/v3/contenttype/forms"/>
+    <ds:schemaRef ds:uri="http://schemas.microsoft.com/office/2006/metadata/contentType"/>
+    <ds:schemaRef ds:uri="http://schemas.microsoft.com/office/2006/metadata/properties/metaAttributes"/>
+    <ds:schemaRef ds:uri="http://www.w3.org/2001/XMLSchema"/>
+    <ds:schemaRef ds:uri="http://schemas.microsoft.com/office/2006/metadata/properties"/>
+    <ds:schemaRef ds:uri="http://schemas.microsoft.com/sharepoint/v3"/>
+    <ds:schemaRef ds:uri="c7dd7a47-5eb0-4219-9c75-8258c822be9e"/>
+    <ds:schemaRef ds:uri="http://schemas.microsoft.com/office/2006/documentManagement/types"/>
+    <ds:schemaRef ds:uri="http://schemas.microsoft.com/office/infopath/2007/PartnerControls"/>
+    <ds:schemaRef ds:uri="http://schemas.openxmlformats.org/package/2006/metadata/core-properties"/>
+    <ds:schemaRef ds:uri="http://purl.org/dc/elements/1.1/"/>
+    <ds:schemaRef ds:uri="http://purl.org/dc/terms/"/>
+    <ds:schemaRef ds:uri="http://schemas.microsoft.com/internal/obd"/>
   </ds:schemaRefs>
 </ds:datastoreItem>
 </file>
</xml_diff>